<commit_message>
Refactor Azure DevOps Enterprise Platform delivery artifacts
- Restructure all 6 delivery documents to EO Framework format
- Add YAML frontmatter to markdown documents
- Update CSV files with proper #WIDTH/#ALIGN headers
- Create 10-slide closeout presentation with speaker notes
- Regenerate all PPTX, XLSX, DOCX outputs via converter
</commit_message>
<xml_diff>
--- a/solutions/azure/devops/enterprise-platform/delivery/closeout-presentation.pptx
+++ b/solutions/azure/devops/enterprise-platform/delivery/closeout-presentation.pptx
@@ -9,6 +9,29 @@
   </p:notesMasterIdLst>
   <p:sldIdLst>
     <p:sldId id="256" r:id="rId7"/>
+    <p:sldId id="257" r:id="rId8"/>
+    <p:sldId id="258" r:id="rId6"/>
+    <p:sldId id="259" r:id="rId5"/>
+    <p:sldId id="260" r:id="rId4"/>
+    <p:sldId id="261" r:id="rId3"/>
+    <p:sldId id="262" r:id="rId2"/>
+    <p:sldId id="263" r:id="rId14"/>
+    <p:sldId id="264" r:id="rId15"/>
+    <p:sldId id="265" r:id="rId16"/>
+    <p:sldId id="266" r:id="rId17"/>
+    <p:sldId id="267" r:id="rId18"/>
+    <p:sldId id="268" r:id="rId19"/>
+    <p:sldId id="269" r:id="rId20"/>
+    <p:sldId id="270" r:id="rId21"/>
+    <p:sldId id="271" r:id="rId22"/>
+    <p:sldId id="272" r:id="rId23"/>
+    <p:sldId id="273" r:id="rId24"/>
+    <p:sldId id="274" r:id="rId25"/>
+    <p:sldId id="275" r:id="rId26"/>
+    <p:sldId id="276" r:id="rId27"/>
+    <p:sldId id="277" r:id="rId28"/>
+    <p:sldId id="278" r:id="rId29"/>
+    <p:sldId id="279" r:id="rId30"/>
   </p:sldIdLst>
   <p:sldSz cx="9144000" cy="5143500" type="screen16x9"/>
   <p:notesSz cx="5143500" cy="9144000"/>
@@ -108,6 +131,9 @@
     <p:ext uri="{EFAFB233-063F-42B5-8137-9DF3F51BA10A}">
       <p15:sldGuideLst xmlns:p15="http://schemas.microsoft.com/office/powerpoint/2012/main"/>
     </p:ext>
+    <p:ext uri="{2D200454-40CA-4A62-9FC3-DE9A4176ACB9}">
+      <p15:notesGuideLst xmlns:p15="http://schemas.microsoft.com/office/powerpoint/2012/main"/>
+    </p:ext>
   </p:extLst>
 </p:presentation>
 </file>
@@ -134,6 +160,59 @@
           <a:chExt cx="0" cy="0"/>
         </a:xfrm>
       </p:grpSpPr>
+      <p:sp>
+        <p:nvSpPr>
+          <p:cNvPr id="2" name="Slide Image Placeholder 1"/>
+          <p:cNvSpPr>
+            <a:spLocks noGrp="1" noRot="1" noChangeAspect="1"/>
+          </p:cNvSpPr>
+          <p:nvPr>
+            <p:ph type="sldImg"/>
+          </p:nvPr>
+        </p:nvSpPr>
+        <p:spPr>
+          <a:xfrm>
+            <a:off x="-171450" y="1143000"/>
+            <a:ext cx="5486400" cy="3086100"/>
+          </a:xfrm>
+          <a:prstGeom prst="rect">
+            <a:avLst/>
+          </a:prstGeom>
+          <a:noFill/>
+          <a:ln w="12700">
+            <a:solidFill>
+              <a:prstClr val="black"/>
+            </a:solidFill>
+          </a:ln>
+        </p:spPr>
+      </p:sp>
+      <p:sp>
+        <p:nvSpPr>
+          <p:cNvPr id="3" name="Notes Placeholder 2"/>
+          <p:cNvSpPr>
+            <a:spLocks noGrp="1"/>
+          </p:cNvSpPr>
+          <p:nvPr>
+            <p:ph type="body" idx="1"/>
+          </p:nvPr>
+        </p:nvSpPr>
+        <p:spPr>
+          <a:xfrm>
+            <a:off x="514350" y="4400550"/>
+            <a:ext cx="4114800" cy="3600450"/>
+          </a:xfrm>
+          <a:prstGeom prst="rect">
+            <a:avLst/>
+          </a:prstGeom>
+        </p:spPr>
+        <p:txBody>
+          <a:bodyPr/>
+          <a:lstStyle/>
+          <a:p>
+            <a:endParaRPr lang="en-US"/>
+          </a:p>
+        </p:txBody>
+      </p:sp>
     </p:spTree>
     <p:extLst>
       <p:ext uri="{BB962C8B-B14F-4D97-AF65-F5344CB8AC3E}">
@@ -627,6 +706,39 @@
       </p:grpSpPr>
       <p:sp>
         <p:nvSpPr>
+          <p:cNvPr id="12" name="Picture Placeholder 13">
+            <a:extLst>
+              <a:ext uri="{FF2B5EF4-FFF2-40B4-BE49-F238E27FC236}">
+                <a16:creationId xmlns:a16="http://schemas.microsoft.com/office/drawing/2014/main" id="{2DB97592-C4D5-B315-7F11-AA14F6EE8A62}"/>
+              </a:ext>
+            </a:extLst>
+          </p:cNvPr>
+          <p:cNvSpPr>
+            <a:spLocks noGrp="1"/>
+          </p:cNvSpPr>
+          <p:nvPr>
+            <p:ph type="pic" sz="quarter" idx="13"/>
+          </p:nvPr>
+        </p:nvSpPr>
+        <p:spPr>
+          <a:xfrm>
+            <a:off x="313593" y="4536078"/>
+            <a:ext cx="2143858" cy="529698"/>
+          </a:xfrm>
+          <a:prstGeom prst="rect">
+            <a:avLst/>
+          </a:prstGeom>
+        </p:spPr>
+        <p:txBody>
+          <a:bodyPr/>
+          <a:lstStyle/>
+          <a:p>
+            <a:endParaRPr lang="en-US" dirty="0"/>
+          </a:p>
+        </p:txBody>
+      </p:sp>
+      <p:sp>
+        <p:nvSpPr>
           <p:cNvPr id="3" name="Shape 1">
             <a:extLst>
               <a:ext uri="{FF2B5EF4-FFF2-40B4-BE49-F238E27FC236}">
@@ -721,69 +833,6 @@
       </p:sp>
       <p:sp>
         <p:nvSpPr>
-          <p:cNvPr id="12" name="Picture Placeholder 13">
-            <a:extLst>
-              <a:ext uri="{FF2B5EF4-FFF2-40B4-BE49-F238E27FC236}">
-                <a16:creationId xmlns:a16="http://schemas.microsoft.com/office/drawing/2014/main" id="{2DB97592-C4D5-B315-7F11-AA14F6EE8A62}"/>
-              </a:ext>
-            </a:extLst>
-          </p:cNvPr>
-          <p:cNvSpPr>
-            <a:spLocks noGrp="1"/>
-          </p:cNvSpPr>
-          <p:nvPr>
-            <p:ph type="pic" sz="quarter" idx="13"/>
-          </p:nvPr>
-        </p:nvSpPr>
-        <p:spPr>
-          <a:xfrm>
-            <a:off x="313593" y="4536078"/>
-            <a:ext cx="2143858" cy="529698"/>
-          </a:xfrm>
-          <a:prstGeom prst="rect">
-            <a:avLst/>
-          </a:prstGeom>
-        </p:spPr>
-        <p:txBody>
-          <a:bodyPr/>
-          <a:lstStyle/>
-          <a:p>
-            <a:endParaRPr lang="en-US" dirty="0"/>
-          </a:p>
-        </p:txBody>
-      </p:sp>
-      <p:pic>
-        <p:nvPicPr>
-          <p:cNvPr id="13" name="Image 0" descr="/home/claude/eo-framework-logo.png">
-            <a:extLst>
-              <a:ext uri="{FF2B5EF4-FFF2-40B4-BE49-F238E27FC236}">
-                <a16:creationId xmlns:a16="http://schemas.microsoft.com/office/drawing/2014/main" id="{25116040-BB88-891D-9118-628A78E99872}"/>
-              </a:ext>
-            </a:extLst>
-          </p:cNvPr>
-          <p:cNvPicPr>
-            <a:picLocks noChangeAspect="1"/>
-          </p:cNvPicPr>
-          <p:nvPr userDrawn="1"/>
-        </p:nvPicPr>
-        <p:blipFill>
-          <a:blip r:embed="rId2"/>
-          <a:stretch>
-            <a:fillRect/>
-          </a:stretch>
-        </p:blipFill>
-        <p:spPr>
-          <a:xfrm>
-            <a:off x="6945879" y="4648200"/>
-            <a:ext cx="1952244" cy="417576"/>
-          </a:xfrm>
-          <a:prstGeom prst="rect">
-            <a:avLst/>
-          </a:prstGeom>
-        </p:spPr>
-      </p:pic>
-      <p:sp>
-        <p:nvSpPr>
           <p:cNvPr id="4" name="Text Placeholder 3">
             <a:extLst>
               <a:ext uri="{FF2B5EF4-FFF2-40B4-BE49-F238E27FC236}">
@@ -811,7 +860,7 @@
           <a:bodyPr/>
           <a:lstStyle>
             <a:lvl1pPr>
-              <a:defRPr sz="2000" baseline="0">
+              <a:defRPr sz="2000" b="1" baseline="0">
                 <a:solidFill>
                   <a:srgbClr val="C00000"/>
                 </a:solidFill>
@@ -857,6 +906,48 @@
             <a:r>
               <a:rPr lang="en-US" dirty="0"/>
               <a:t>Fourth level</a:t>
+            </a:r>
+          </a:p>
+        </p:txBody>
+      </p:sp>
+      <p:sp>
+        <p:nvSpPr>
+          <p:cNvPr id="5" name="Text Placeholder 4">
+            <a:extLst>
+              <a:ext uri="{FF2B5EF4-FFF2-40B4-BE49-F238E27FC236}">
+                <a16:creationId xmlns:a16="http://schemas.microsoft.com/office/drawing/2014/main" id="{57F71806-AFEA-DD6D-E6AA-E2A002E682DE}"/>
+              </a:ext>
+            </a:extLst>
+          </p:cNvPr>
+          <p:cNvSpPr>
+            <a:spLocks noGrp="1"/>
+          </p:cNvSpPr>
+          <p:nvPr>
+            <p:ph type="body" sz="quarter" idx="15" hasCustomPrompt="1"/>
+          </p:nvPr>
+        </p:nvSpPr>
+        <p:spPr>
+          <a:xfrm>
+            <a:off x="5627076" y="4738688"/>
+            <a:ext cx="3218473" cy="238125"/>
+          </a:xfrm>
+          <a:prstGeom prst="rect">
+            <a:avLst/>
+          </a:prstGeom>
+        </p:spPr>
+        <p:txBody>
+          <a:bodyPr/>
+          <a:lstStyle>
+            <a:lvl5pPr algn="r">
+              <a:buNone/>
+              <a:defRPr sz="1100"/>
+            </a:lvl5pPr>
+          </a:lstStyle>
+          <a:p>
+            <a:pPr lvl="4"/>
+            <a:r>
+              <a:rPr lang="en-US" dirty="0"/>
+              <a:t>Project Name</a:t>
             </a:r>
           </a:p>
         </p:txBody>
@@ -893,6 +984,39 @@
       </p:grpSpPr>
       <p:sp>
         <p:nvSpPr>
+          <p:cNvPr id="12" name="Picture Placeholder 13">
+            <a:extLst>
+              <a:ext uri="{FF2B5EF4-FFF2-40B4-BE49-F238E27FC236}">
+                <a16:creationId xmlns:a16="http://schemas.microsoft.com/office/drawing/2014/main" id="{2DB97592-C4D5-B315-7F11-AA14F6EE8A62}"/>
+              </a:ext>
+            </a:extLst>
+          </p:cNvPr>
+          <p:cNvSpPr>
+            <a:spLocks noGrp="1"/>
+          </p:cNvSpPr>
+          <p:nvPr>
+            <p:ph type="pic" sz="quarter" idx="13"/>
+          </p:nvPr>
+        </p:nvSpPr>
+        <p:spPr>
+          <a:xfrm>
+            <a:off x="313593" y="4536078"/>
+            <a:ext cx="2143858" cy="529698"/>
+          </a:xfrm>
+          <a:prstGeom prst="rect">
+            <a:avLst/>
+          </a:prstGeom>
+        </p:spPr>
+        <p:txBody>
+          <a:bodyPr/>
+          <a:lstStyle/>
+          <a:p>
+            <a:endParaRPr lang="en-US" dirty="0"/>
+          </a:p>
+        </p:txBody>
+      </p:sp>
+      <p:sp>
+        <p:nvSpPr>
           <p:cNvPr id="3" name="Shape 1">
             <a:extLst>
               <a:ext uri="{FF2B5EF4-FFF2-40B4-BE49-F238E27FC236}">
@@ -987,69 +1111,6 @@
       </p:sp>
       <p:sp>
         <p:nvSpPr>
-          <p:cNvPr id="12" name="Picture Placeholder 13">
-            <a:extLst>
-              <a:ext uri="{FF2B5EF4-FFF2-40B4-BE49-F238E27FC236}">
-                <a16:creationId xmlns:a16="http://schemas.microsoft.com/office/drawing/2014/main" id="{2DB97592-C4D5-B315-7F11-AA14F6EE8A62}"/>
-              </a:ext>
-            </a:extLst>
-          </p:cNvPr>
-          <p:cNvSpPr>
-            <a:spLocks noGrp="1"/>
-          </p:cNvSpPr>
-          <p:nvPr>
-            <p:ph type="pic" sz="quarter" idx="13"/>
-          </p:nvPr>
-        </p:nvSpPr>
-        <p:spPr>
-          <a:xfrm>
-            <a:off x="313593" y="4536078"/>
-            <a:ext cx="2143858" cy="529698"/>
-          </a:xfrm>
-          <a:prstGeom prst="rect">
-            <a:avLst/>
-          </a:prstGeom>
-        </p:spPr>
-        <p:txBody>
-          <a:bodyPr/>
-          <a:lstStyle/>
-          <a:p>
-            <a:endParaRPr lang="en-US" dirty="0"/>
-          </a:p>
-        </p:txBody>
-      </p:sp>
-      <p:pic>
-        <p:nvPicPr>
-          <p:cNvPr id="13" name="Image 0" descr="/home/claude/eo-framework-logo.png">
-            <a:extLst>
-              <a:ext uri="{FF2B5EF4-FFF2-40B4-BE49-F238E27FC236}">
-                <a16:creationId xmlns:a16="http://schemas.microsoft.com/office/drawing/2014/main" id="{25116040-BB88-891D-9118-628A78E99872}"/>
-              </a:ext>
-            </a:extLst>
-          </p:cNvPr>
-          <p:cNvPicPr>
-            <a:picLocks noChangeAspect="1"/>
-          </p:cNvPicPr>
-          <p:nvPr userDrawn="1"/>
-        </p:nvPicPr>
-        <p:blipFill>
-          <a:blip r:embed="rId2"/>
-          <a:stretch>
-            <a:fillRect/>
-          </a:stretch>
-        </p:blipFill>
-        <p:spPr>
-          <a:xfrm>
-            <a:off x="6945879" y="4648200"/>
-            <a:ext cx="1952244" cy="417576"/>
-          </a:xfrm>
-          <a:prstGeom prst="rect">
-            <a:avLst/>
-          </a:prstGeom>
-        </p:spPr>
-      </p:pic>
-      <p:sp>
-        <p:nvSpPr>
           <p:cNvPr id="4" name="Text Placeholder 3">
             <a:extLst>
               <a:ext uri="{FF2B5EF4-FFF2-40B4-BE49-F238E27FC236}">
@@ -1109,6 +1170,48 @@
             <a:r>
               <a:rPr lang="en-US" dirty="0"/>
               <a:t>Bullet Point 2</a:t>
+            </a:r>
+          </a:p>
+        </p:txBody>
+      </p:sp>
+      <p:sp>
+        <p:nvSpPr>
+          <p:cNvPr id="5" name="Text Placeholder 4">
+            <a:extLst>
+              <a:ext uri="{FF2B5EF4-FFF2-40B4-BE49-F238E27FC236}">
+                <a16:creationId xmlns:a16="http://schemas.microsoft.com/office/drawing/2014/main" id="{162079A5-28FD-9D2F-2B9B-2FC8F9339A31}"/>
+              </a:ext>
+            </a:extLst>
+          </p:cNvPr>
+          <p:cNvSpPr>
+            <a:spLocks noGrp="1"/>
+          </p:cNvSpPr>
+          <p:nvPr>
+            <p:ph type="body" sz="quarter" idx="15" hasCustomPrompt="1"/>
+          </p:nvPr>
+        </p:nvSpPr>
+        <p:spPr>
+          <a:xfrm>
+            <a:off x="5627076" y="4738688"/>
+            <a:ext cx="3218473" cy="238125"/>
+          </a:xfrm>
+          <a:prstGeom prst="rect">
+            <a:avLst/>
+          </a:prstGeom>
+        </p:spPr>
+        <p:txBody>
+          <a:bodyPr/>
+          <a:lstStyle>
+            <a:lvl5pPr algn="r">
+              <a:buNone/>
+              <a:defRPr sz="1100"/>
+            </a:lvl5pPr>
+          </a:lstStyle>
+          <a:p>
+            <a:pPr lvl="4"/>
+            <a:r>
+              <a:rPr lang="en-US" dirty="0"/>
+              <a:t>Project Name</a:t>
             </a:r>
           </a:p>
         </p:txBody>
@@ -1145,6 +1248,39 @@
       </p:grpSpPr>
       <p:sp>
         <p:nvSpPr>
+          <p:cNvPr id="10" name="Picture Placeholder 13">
+            <a:extLst>
+              <a:ext uri="{FF2B5EF4-FFF2-40B4-BE49-F238E27FC236}">
+                <a16:creationId xmlns:a16="http://schemas.microsoft.com/office/drawing/2014/main" id="{6A0FA445-7602-F06E-EC73-5504EBF827CC}"/>
+              </a:ext>
+            </a:extLst>
+          </p:cNvPr>
+          <p:cNvSpPr>
+            <a:spLocks noGrp="1"/>
+          </p:cNvSpPr>
+          <p:nvPr>
+            <p:ph type="pic" sz="quarter" idx="14"/>
+          </p:nvPr>
+        </p:nvSpPr>
+        <p:spPr>
+          <a:xfrm>
+            <a:off x="313592" y="4536078"/>
+            <a:ext cx="2121877" cy="529698"/>
+          </a:xfrm>
+          <a:prstGeom prst="rect">
+            <a:avLst/>
+          </a:prstGeom>
+        </p:spPr>
+        <p:txBody>
+          <a:bodyPr/>
+          <a:lstStyle/>
+          <a:p>
+            <a:endParaRPr lang="en-US" dirty="0"/>
+          </a:p>
+        </p:txBody>
+      </p:sp>
+      <p:sp>
+        <p:nvSpPr>
           <p:cNvPr id="3" name="Shape 1">
             <a:extLst>
               <a:ext uri="{FF2B5EF4-FFF2-40B4-BE49-F238E27FC236}">
@@ -1237,69 +1373,6 @@
           </a:p>
         </p:txBody>
       </p:sp>
-      <p:pic>
-        <p:nvPicPr>
-          <p:cNvPr id="8" name="Image 0" descr="/home/claude/eo-framework-logo.png">
-            <a:extLst>
-              <a:ext uri="{FF2B5EF4-FFF2-40B4-BE49-F238E27FC236}">
-                <a16:creationId xmlns:a16="http://schemas.microsoft.com/office/drawing/2014/main" id="{4B7035C6-0EF1-6BD3-318E-553D1AAD6709}"/>
-              </a:ext>
-            </a:extLst>
-          </p:cNvPr>
-          <p:cNvPicPr>
-            <a:picLocks noChangeAspect="1"/>
-          </p:cNvPicPr>
-          <p:nvPr userDrawn="1"/>
-        </p:nvPicPr>
-        <p:blipFill>
-          <a:blip r:embed="rId2"/>
-          <a:stretch>
-            <a:fillRect/>
-          </a:stretch>
-        </p:blipFill>
-        <p:spPr>
-          <a:xfrm>
-            <a:off x="6945879" y="4648200"/>
-            <a:ext cx="1952244" cy="417576"/>
-          </a:xfrm>
-          <a:prstGeom prst="rect">
-            <a:avLst/>
-          </a:prstGeom>
-        </p:spPr>
-      </p:pic>
-      <p:sp>
-        <p:nvSpPr>
-          <p:cNvPr id="10" name="Picture Placeholder 13">
-            <a:extLst>
-              <a:ext uri="{FF2B5EF4-FFF2-40B4-BE49-F238E27FC236}">
-                <a16:creationId xmlns:a16="http://schemas.microsoft.com/office/drawing/2014/main" id="{6A0FA445-7602-F06E-EC73-5504EBF827CC}"/>
-              </a:ext>
-            </a:extLst>
-          </p:cNvPr>
-          <p:cNvSpPr>
-            <a:spLocks noGrp="1"/>
-          </p:cNvSpPr>
-          <p:nvPr>
-            <p:ph type="pic" sz="quarter" idx="14"/>
-          </p:nvPr>
-        </p:nvSpPr>
-        <p:spPr>
-          <a:xfrm>
-            <a:off x="313592" y="4536078"/>
-            <a:ext cx="2121877" cy="529698"/>
-          </a:xfrm>
-          <a:prstGeom prst="rect">
-            <a:avLst/>
-          </a:prstGeom>
-        </p:spPr>
-        <p:txBody>
-          <a:bodyPr/>
-          <a:lstStyle/>
-          <a:p>
-            <a:endParaRPr lang="en-US" dirty="0"/>
-          </a:p>
-        </p:txBody>
-      </p:sp>
       <p:sp>
         <p:nvSpPr>
           <p:cNvPr id="6" name="Text Placeholder 5">
@@ -1319,7 +1392,7 @@
         <p:spPr>
           <a:xfrm>
             <a:off x="193675" y="678433"/>
-            <a:ext cx="4462463" cy="3785515"/>
+            <a:ext cx="4431079" cy="3785515"/>
           </a:xfrm>
           <a:prstGeom prst="rect">
             <a:avLst/>
@@ -1329,7 +1402,7 @@
           <a:bodyPr/>
           <a:lstStyle>
             <a:lvl1pPr>
-              <a:defRPr sz="1800">
+              <a:defRPr sz="1800" b="1">
                 <a:solidFill>
                   <a:srgbClr val="C00000"/>
                 </a:solidFill>
@@ -1403,8 +1476,8 @@
         </p:nvSpPr>
         <p:spPr>
           <a:xfrm>
-            <a:off x="4840288" y="678433"/>
-            <a:ext cx="4110037" cy="3785515"/>
+            <a:off x="4721470" y="678433"/>
+            <a:ext cx="4228856" cy="3785515"/>
           </a:xfrm>
           <a:prstGeom prst="rect">
             <a:avLst/>
@@ -1414,7 +1487,7 @@
           <a:bodyPr/>
           <a:lstStyle>
             <a:lvl1pPr>
-              <a:defRPr sz="1800">
+              <a:defRPr sz="1800" b="1">
                 <a:solidFill>
                   <a:srgbClr val="C00000"/>
                 </a:solidFill>
@@ -1466,6 +1539,48 @@
             <a:r>
               <a:rPr lang="en-US" dirty="0"/>
               <a:t>Fifth level</a:t>
+            </a:r>
+          </a:p>
+        </p:txBody>
+      </p:sp>
+      <p:sp>
+        <p:nvSpPr>
+          <p:cNvPr id="4" name="Text Placeholder 4">
+            <a:extLst>
+              <a:ext uri="{FF2B5EF4-FFF2-40B4-BE49-F238E27FC236}">
+                <a16:creationId xmlns:a16="http://schemas.microsoft.com/office/drawing/2014/main" id="{5DF49ED0-89F0-F008-ADD7-D71F338C8B9B}"/>
+              </a:ext>
+            </a:extLst>
+          </p:cNvPr>
+          <p:cNvSpPr>
+            <a:spLocks noGrp="1"/>
+          </p:cNvSpPr>
+          <p:nvPr>
+            <p:ph type="body" sz="quarter" idx="15" hasCustomPrompt="1"/>
+          </p:nvPr>
+        </p:nvSpPr>
+        <p:spPr>
+          <a:xfrm>
+            <a:off x="5697414" y="4681864"/>
+            <a:ext cx="3218473" cy="238125"/>
+          </a:xfrm>
+          <a:prstGeom prst="rect">
+            <a:avLst/>
+          </a:prstGeom>
+        </p:spPr>
+        <p:txBody>
+          <a:bodyPr/>
+          <a:lstStyle>
+            <a:lvl5pPr algn="r">
+              <a:buNone/>
+              <a:defRPr sz="1100"/>
+            </a:lvl5pPr>
+          </a:lstStyle>
+          <a:p>
+            <a:pPr lvl="4"/>
+            <a:r>
+              <a:rPr lang="en-US" dirty="0"/>
+              <a:t>Project Name</a:t>
             </a:r>
           </a:p>
         </p:txBody>
@@ -1502,6 +1617,39 @@
       </p:grpSpPr>
       <p:sp>
         <p:nvSpPr>
+          <p:cNvPr id="12" name="Picture Placeholder 13">
+            <a:extLst>
+              <a:ext uri="{FF2B5EF4-FFF2-40B4-BE49-F238E27FC236}">
+                <a16:creationId xmlns:a16="http://schemas.microsoft.com/office/drawing/2014/main" id="{2DB97592-C4D5-B315-7F11-AA14F6EE8A62}"/>
+              </a:ext>
+            </a:extLst>
+          </p:cNvPr>
+          <p:cNvSpPr>
+            <a:spLocks noGrp="1"/>
+          </p:cNvSpPr>
+          <p:nvPr>
+            <p:ph type="pic" sz="quarter" idx="13"/>
+          </p:nvPr>
+        </p:nvSpPr>
+        <p:spPr>
+          <a:xfrm>
+            <a:off x="313592" y="4536078"/>
+            <a:ext cx="2126273" cy="529698"/>
+          </a:xfrm>
+          <a:prstGeom prst="rect">
+            <a:avLst/>
+          </a:prstGeom>
+        </p:spPr>
+        <p:txBody>
+          <a:bodyPr/>
+          <a:lstStyle/>
+          <a:p>
+            <a:endParaRPr lang="en-US" dirty="0"/>
+          </a:p>
+        </p:txBody>
+      </p:sp>
+      <p:sp>
+        <p:nvSpPr>
           <p:cNvPr id="3" name="Shape 1">
             <a:extLst>
               <a:ext uri="{FF2B5EF4-FFF2-40B4-BE49-F238E27FC236}">
@@ -1623,69 +1771,6 @@
       </p:sp>
       <p:sp>
         <p:nvSpPr>
-          <p:cNvPr id="12" name="Picture Placeholder 13">
-            <a:extLst>
-              <a:ext uri="{FF2B5EF4-FFF2-40B4-BE49-F238E27FC236}">
-                <a16:creationId xmlns:a16="http://schemas.microsoft.com/office/drawing/2014/main" id="{2DB97592-C4D5-B315-7F11-AA14F6EE8A62}"/>
-              </a:ext>
-            </a:extLst>
-          </p:cNvPr>
-          <p:cNvSpPr>
-            <a:spLocks noGrp="1"/>
-          </p:cNvSpPr>
-          <p:nvPr>
-            <p:ph type="pic" sz="quarter" idx="13"/>
-          </p:nvPr>
-        </p:nvSpPr>
-        <p:spPr>
-          <a:xfrm>
-            <a:off x="313592" y="4536078"/>
-            <a:ext cx="2126273" cy="529698"/>
-          </a:xfrm>
-          <a:prstGeom prst="rect">
-            <a:avLst/>
-          </a:prstGeom>
-        </p:spPr>
-        <p:txBody>
-          <a:bodyPr/>
-          <a:lstStyle/>
-          <a:p>
-            <a:endParaRPr lang="en-US" dirty="0"/>
-          </a:p>
-        </p:txBody>
-      </p:sp>
-      <p:pic>
-        <p:nvPicPr>
-          <p:cNvPr id="13" name="Image 0" descr="/home/claude/eo-framework-logo.png">
-            <a:extLst>
-              <a:ext uri="{FF2B5EF4-FFF2-40B4-BE49-F238E27FC236}">
-                <a16:creationId xmlns:a16="http://schemas.microsoft.com/office/drawing/2014/main" id="{25116040-BB88-891D-9118-628A78E99872}"/>
-              </a:ext>
-            </a:extLst>
-          </p:cNvPr>
-          <p:cNvPicPr>
-            <a:picLocks noChangeAspect="1"/>
-          </p:cNvPicPr>
-          <p:nvPr userDrawn="1"/>
-        </p:nvPicPr>
-        <p:blipFill>
-          <a:blip r:embed="rId2"/>
-          <a:stretch>
-            <a:fillRect/>
-          </a:stretch>
-        </p:blipFill>
-        <p:spPr>
-          <a:xfrm>
-            <a:off x="6945879" y="4648200"/>
-            <a:ext cx="1952244" cy="417576"/>
-          </a:xfrm>
-          <a:prstGeom prst="rect">
-            <a:avLst/>
-          </a:prstGeom>
-        </p:spPr>
-      </p:pic>
-      <p:sp>
-        <p:nvSpPr>
           <p:cNvPr id="5" name="Table Placeholder 4">
             <a:extLst>
               <a:ext uri="{FF2B5EF4-FFF2-40B4-BE49-F238E27FC236}">
@@ -1714,6 +1799,48 @@
           <a:lstStyle/>
           <a:p>
             <a:endParaRPr lang="en-US"/>
+          </a:p>
+        </p:txBody>
+      </p:sp>
+      <p:sp>
+        <p:nvSpPr>
+          <p:cNvPr id="4" name="Text Placeholder 4">
+            <a:extLst>
+              <a:ext uri="{FF2B5EF4-FFF2-40B4-BE49-F238E27FC236}">
+                <a16:creationId xmlns:a16="http://schemas.microsoft.com/office/drawing/2014/main" id="{A00DC936-676C-1BAA-B4B4-D45CC5951D6E}"/>
+              </a:ext>
+            </a:extLst>
+          </p:cNvPr>
+          <p:cNvSpPr>
+            <a:spLocks noGrp="1"/>
+          </p:cNvSpPr>
+          <p:nvPr>
+            <p:ph type="body" sz="quarter" idx="15" hasCustomPrompt="1"/>
+          </p:nvPr>
+        </p:nvSpPr>
+        <p:spPr>
+          <a:xfrm>
+            <a:off x="5749315" y="4681864"/>
+            <a:ext cx="3218473" cy="238125"/>
+          </a:xfrm>
+          <a:prstGeom prst="rect">
+            <a:avLst/>
+          </a:prstGeom>
+        </p:spPr>
+        <p:txBody>
+          <a:bodyPr/>
+          <a:lstStyle>
+            <a:lvl5pPr algn="r">
+              <a:buNone/>
+              <a:defRPr sz="1100"/>
+            </a:lvl5pPr>
+          </a:lstStyle>
+          <a:p>
+            <a:pPr lvl="4"/>
+            <a:r>
+              <a:rPr lang="en-US" dirty="0"/>
+              <a:t>Project Name</a:t>
+            </a:r>
           </a:p>
         </p:txBody>
       </p:sp>
@@ -1749,6 +1876,39 @@
       </p:grpSpPr>
       <p:sp>
         <p:nvSpPr>
+          <p:cNvPr id="10" name="Picture Placeholder 13">
+            <a:extLst>
+              <a:ext uri="{FF2B5EF4-FFF2-40B4-BE49-F238E27FC236}">
+                <a16:creationId xmlns:a16="http://schemas.microsoft.com/office/drawing/2014/main" id="{6A0FA445-7602-F06E-EC73-5504EBF827CC}"/>
+              </a:ext>
+            </a:extLst>
+          </p:cNvPr>
+          <p:cNvSpPr>
+            <a:spLocks noGrp="1"/>
+          </p:cNvSpPr>
+          <p:nvPr>
+            <p:ph type="pic" sz="quarter" idx="14"/>
+          </p:nvPr>
+        </p:nvSpPr>
+        <p:spPr>
+          <a:xfrm>
+            <a:off x="313592" y="4536078"/>
+            <a:ext cx="2130670" cy="529698"/>
+          </a:xfrm>
+          <a:prstGeom prst="rect">
+            <a:avLst/>
+          </a:prstGeom>
+        </p:spPr>
+        <p:txBody>
+          <a:bodyPr/>
+          <a:lstStyle/>
+          <a:p>
+            <a:endParaRPr lang="en-US" dirty="0"/>
+          </a:p>
+        </p:txBody>
+      </p:sp>
+      <p:sp>
+        <p:nvSpPr>
           <p:cNvPr id="3" name="Shape 1">
             <a:extLst>
               <a:ext uri="{FF2B5EF4-FFF2-40B4-BE49-F238E27FC236}">
@@ -1841,69 +2001,6 @@
           </a:p>
         </p:txBody>
       </p:sp>
-      <p:pic>
-        <p:nvPicPr>
-          <p:cNvPr id="8" name="Image 0" descr="/home/claude/eo-framework-logo.png">
-            <a:extLst>
-              <a:ext uri="{FF2B5EF4-FFF2-40B4-BE49-F238E27FC236}">
-                <a16:creationId xmlns:a16="http://schemas.microsoft.com/office/drawing/2014/main" id="{4B7035C6-0EF1-6BD3-318E-553D1AAD6709}"/>
-              </a:ext>
-            </a:extLst>
-          </p:cNvPr>
-          <p:cNvPicPr>
-            <a:picLocks noChangeAspect="1"/>
-          </p:cNvPicPr>
-          <p:nvPr userDrawn="1"/>
-        </p:nvPicPr>
-        <p:blipFill>
-          <a:blip r:embed="rId2"/>
-          <a:stretch>
-            <a:fillRect/>
-          </a:stretch>
-        </p:blipFill>
-        <p:spPr>
-          <a:xfrm>
-            <a:off x="6945879" y="4648200"/>
-            <a:ext cx="1952244" cy="417576"/>
-          </a:xfrm>
-          <a:prstGeom prst="rect">
-            <a:avLst/>
-          </a:prstGeom>
-        </p:spPr>
-      </p:pic>
-      <p:sp>
-        <p:nvSpPr>
-          <p:cNvPr id="10" name="Picture Placeholder 13">
-            <a:extLst>
-              <a:ext uri="{FF2B5EF4-FFF2-40B4-BE49-F238E27FC236}">
-                <a16:creationId xmlns:a16="http://schemas.microsoft.com/office/drawing/2014/main" id="{6A0FA445-7602-F06E-EC73-5504EBF827CC}"/>
-              </a:ext>
-            </a:extLst>
-          </p:cNvPr>
-          <p:cNvSpPr>
-            <a:spLocks noGrp="1"/>
-          </p:cNvSpPr>
-          <p:nvPr>
-            <p:ph type="pic" sz="quarter" idx="14"/>
-          </p:nvPr>
-        </p:nvSpPr>
-        <p:spPr>
-          <a:xfrm>
-            <a:off x="313592" y="4536078"/>
-            <a:ext cx="2130670" cy="529698"/>
-          </a:xfrm>
-          <a:prstGeom prst="rect">
-            <a:avLst/>
-          </a:prstGeom>
-        </p:spPr>
-        <p:txBody>
-          <a:bodyPr/>
-          <a:lstStyle/>
-          <a:p>
-            <a:endParaRPr lang="en-US" dirty="0"/>
-          </a:p>
-        </p:txBody>
-      </p:sp>
       <p:sp>
         <p:nvSpPr>
           <p:cNvPr id="6" name="Picture Placeholder 5">
@@ -1966,7 +2063,7 @@
           <a:bodyPr/>
           <a:lstStyle>
             <a:lvl1pPr>
-              <a:defRPr sz="1800">
+              <a:defRPr sz="1800" b="1">
                 <a:solidFill>
                   <a:srgbClr val="C00000"/>
                 </a:solidFill>
@@ -2018,6 +2115,48 @@
             <a:r>
               <a:rPr lang="en-US" dirty="0"/>
               <a:t>Fifth level</a:t>
+            </a:r>
+          </a:p>
+        </p:txBody>
+      </p:sp>
+      <p:sp>
+        <p:nvSpPr>
+          <p:cNvPr id="2" name="Text Placeholder 4">
+            <a:extLst>
+              <a:ext uri="{FF2B5EF4-FFF2-40B4-BE49-F238E27FC236}">
+                <a16:creationId xmlns:a16="http://schemas.microsoft.com/office/drawing/2014/main" id="{6D03683B-7C4B-D474-74C5-EC53E3BB515B}"/>
+              </a:ext>
+            </a:extLst>
+          </p:cNvPr>
+          <p:cNvSpPr>
+            <a:spLocks noGrp="1"/>
+          </p:cNvSpPr>
+          <p:nvPr>
+            <p:ph type="body" sz="quarter" idx="17" hasCustomPrompt="1"/>
+          </p:nvPr>
+        </p:nvSpPr>
+        <p:spPr>
+          <a:xfrm>
+            <a:off x="5781065" y="4729530"/>
+            <a:ext cx="3218473" cy="238125"/>
+          </a:xfrm>
+          <a:prstGeom prst="rect">
+            <a:avLst/>
+          </a:prstGeom>
+        </p:spPr>
+        <p:txBody>
+          <a:bodyPr/>
+          <a:lstStyle>
+            <a:lvl5pPr algn="r">
+              <a:buNone/>
+              <a:defRPr sz="1100"/>
+            </a:lvl5pPr>
+          </a:lstStyle>
+          <a:p>
+            <a:pPr lvl="4"/>
+            <a:r>
+              <a:rPr lang="en-US" dirty="0"/>
+              <a:t>Project Name</a:t>
             </a:r>
           </a:p>
         </p:txBody>
@@ -2054,6 +2193,39 @@
       </p:grpSpPr>
       <p:sp>
         <p:nvSpPr>
+          <p:cNvPr id="10" name="Picture Placeholder 13">
+            <a:extLst>
+              <a:ext uri="{FF2B5EF4-FFF2-40B4-BE49-F238E27FC236}">
+                <a16:creationId xmlns:a16="http://schemas.microsoft.com/office/drawing/2014/main" id="{6A0FA445-7602-F06E-EC73-5504EBF827CC}"/>
+              </a:ext>
+            </a:extLst>
+          </p:cNvPr>
+          <p:cNvSpPr>
+            <a:spLocks noGrp="1"/>
+          </p:cNvSpPr>
+          <p:nvPr>
+            <p:ph type="pic" sz="quarter" idx="14"/>
+          </p:nvPr>
+        </p:nvSpPr>
+        <p:spPr>
+          <a:xfrm>
+            <a:off x="313592" y="4536078"/>
+            <a:ext cx="2104294" cy="529698"/>
+          </a:xfrm>
+          <a:prstGeom prst="rect">
+            <a:avLst/>
+          </a:prstGeom>
+        </p:spPr>
+        <p:txBody>
+          <a:bodyPr/>
+          <a:lstStyle/>
+          <a:p>
+            <a:endParaRPr lang="en-US" dirty="0"/>
+          </a:p>
+        </p:txBody>
+      </p:sp>
+      <p:sp>
+        <p:nvSpPr>
           <p:cNvPr id="3" name="Shape 1">
             <a:extLst>
               <a:ext uri="{FF2B5EF4-FFF2-40B4-BE49-F238E27FC236}">
@@ -2146,69 +2318,6 @@
           </a:p>
         </p:txBody>
       </p:sp>
-      <p:pic>
-        <p:nvPicPr>
-          <p:cNvPr id="8" name="Image 0" descr="/home/claude/eo-framework-logo.png">
-            <a:extLst>
-              <a:ext uri="{FF2B5EF4-FFF2-40B4-BE49-F238E27FC236}">
-                <a16:creationId xmlns:a16="http://schemas.microsoft.com/office/drawing/2014/main" id="{4B7035C6-0EF1-6BD3-318E-553D1AAD6709}"/>
-              </a:ext>
-            </a:extLst>
-          </p:cNvPr>
-          <p:cNvPicPr>
-            <a:picLocks noChangeAspect="1"/>
-          </p:cNvPicPr>
-          <p:nvPr userDrawn="1"/>
-        </p:nvPicPr>
-        <p:blipFill>
-          <a:blip r:embed="rId2"/>
-          <a:stretch>
-            <a:fillRect/>
-          </a:stretch>
-        </p:blipFill>
-        <p:spPr>
-          <a:xfrm>
-            <a:off x="6945879" y="4648200"/>
-            <a:ext cx="1952244" cy="417576"/>
-          </a:xfrm>
-          <a:prstGeom prst="rect">
-            <a:avLst/>
-          </a:prstGeom>
-        </p:spPr>
-      </p:pic>
-      <p:sp>
-        <p:nvSpPr>
-          <p:cNvPr id="10" name="Picture Placeholder 13">
-            <a:extLst>
-              <a:ext uri="{FF2B5EF4-FFF2-40B4-BE49-F238E27FC236}">
-                <a16:creationId xmlns:a16="http://schemas.microsoft.com/office/drawing/2014/main" id="{6A0FA445-7602-F06E-EC73-5504EBF827CC}"/>
-              </a:ext>
-            </a:extLst>
-          </p:cNvPr>
-          <p:cNvSpPr>
-            <a:spLocks noGrp="1"/>
-          </p:cNvSpPr>
-          <p:nvPr>
-            <p:ph type="pic" sz="quarter" idx="14"/>
-          </p:nvPr>
-        </p:nvSpPr>
-        <p:spPr>
-          <a:xfrm>
-            <a:off x="313592" y="4536078"/>
-            <a:ext cx="2104294" cy="529698"/>
-          </a:xfrm>
-          <a:prstGeom prst="rect">
-            <a:avLst/>
-          </a:prstGeom>
-        </p:spPr>
-        <p:txBody>
-          <a:bodyPr/>
-          <a:lstStyle/>
-          <a:p>
-            <a:endParaRPr lang="en-US" dirty="0"/>
-          </a:p>
-        </p:txBody>
-      </p:sp>
       <p:sp>
         <p:nvSpPr>
           <p:cNvPr id="5" name="Chart Placeholder 4">
@@ -2271,7 +2380,7 @@
           <a:bodyPr/>
           <a:lstStyle>
             <a:lvl1pPr>
-              <a:defRPr sz="1800">
+              <a:defRPr sz="1800" b="1">
                 <a:solidFill>
                   <a:srgbClr val="C00000"/>
                 </a:solidFill>
@@ -2323,6 +2432,48 @@
             <a:r>
               <a:rPr lang="en-US" dirty="0"/>
               <a:t>Fifth level</a:t>
+            </a:r>
+          </a:p>
+        </p:txBody>
+      </p:sp>
+      <p:sp>
+        <p:nvSpPr>
+          <p:cNvPr id="4" name="Text Placeholder 4">
+            <a:extLst>
+              <a:ext uri="{FF2B5EF4-FFF2-40B4-BE49-F238E27FC236}">
+                <a16:creationId xmlns:a16="http://schemas.microsoft.com/office/drawing/2014/main" id="{A1231DFE-6A5A-950E-159E-9E1D3D45FD36}"/>
+              </a:ext>
+            </a:extLst>
+          </p:cNvPr>
+          <p:cNvSpPr>
+            <a:spLocks noGrp="1"/>
+          </p:cNvSpPr>
+          <p:nvPr>
+            <p:ph type="body" sz="quarter" idx="17" hasCustomPrompt="1"/>
+          </p:nvPr>
+        </p:nvSpPr>
+        <p:spPr>
+          <a:xfrm>
+            <a:off x="5679465" y="4681864"/>
+            <a:ext cx="3218473" cy="238125"/>
+          </a:xfrm>
+          <a:prstGeom prst="rect">
+            <a:avLst/>
+          </a:prstGeom>
+        </p:spPr>
+        <p:txBody>
+          <a:bodyPr/>
+          <a:lstStyle>
+            <a:lvl5pPr algn="r">
+              <a:buNone/>
+              <a:defRPr sz="900"/>
+            </a:lvl5pPr>
+          </a:lstStyle>
+          <a:p>
+            <a:pPr lvl="4"/>
+            <a:r>
+              <a:rPr lang="en-US" dirty="0"/>
+              <a:t>Project Name</a:t>
             </a:r>
           </a:p>
         </p:txBody>
@@ -3137,7 +3288,7 @@
             <a:spLocks noGrp="1"/>
           </p:cNvSpPr>
           <p:nvPr>
-            <p:ph type="pic" idx="10" sz="quarter"/>
+            <p:ph type="pic" idx="13" sz="quarter"/>
           </p:nvPr>
         </p:nvSpPr>
         <p:spPr/>
@@ -3149,23 +3300,93 @@
             <a:spLocks noGrp="1"/>
           </p:cNvSpPr>
           <p:nvPr>
-            <p:ph type="body" idx="12" sz="quarter"/>
-          </p:nvPr>
-        </p:nvSpPr>
-        <p:spPr/>
-        <p:txBody>
-          <a:bodyPr/>
-          <a:lstStyle/>
-          <a:p>
-            <a:r>
-              <a:t>Presentation Title</a:t>
-            </a:r>
-          </a:p>
-        </p:txBody>
-      </p:sp>
-      <p:sp>
-        <p:nvSpPr>
-          <p:cNvPr id="4" name="Picture Placeholder 3"/>
+            <p:ph type="body" idx="10" sz="quarter"/>
+          </p:nvPr>
+        </p:nvSpPr>
+        <p:spPr/>
+        <p:txBody>
+          <a:bodyPr/>
+          <a:lstStyle/>
+          <a:p>
+            <a:pPr algn="l"/>
+            <a:r>
+              <a:t>Delivered Capabilities</a:t>
+            </a:r>
+          </a:p>
+        </p:txBody>
+      </p:sp>
+      <p:sp>
+        <p:nvSpPr>
+          <p:cNvPr id="4" name="Text Placeholder 3"/>
+          <p:cNvSpPr>
+            <a:spLocks noGrp="1"/>
+          </p:cNvSpPr>
+          <p:nvPr>
+            <p:ph type="body" idx="14" sz="quarter"/>
+          </p:nvPr>
+        </p:nvSpPr>
+        <p:spPr/>
+        <p:txBody>
+          <a:bodyPr/>
+          <a:lstStyle/>
+          <a:p>
+            <a:pPr/>
+            <a:r>
+              <a:t>Azure DevOps organization setup</a:t>
+            </a:r>
+          </a:p>
+          <a:p>
+            <a:pPr/>
+            <a:r>
+              <a:t>CI/CD pipeline framework deployed</a:t>
+            </a:r>
+          </a:p>
+          <a:p>
+            <a:pPr/>
+            <a:r>
+              <a:t>Container infrastructure operational</a:t>
+            </a:r>
+          </a:p>
+        </p:txBody>
+      </p:sp>
+      <p:sp>
+        <p:nvSpPr>
+          <p:cNvPr id="5" name="Text Placeholder 4"/>
+          <p:cNvSpPr>
+            <a:spLocks noGrp="1"/>
+          </p:cNvSpPr>
+          <p:nvPr>
+            <p:ph type="body" idx="15" sz="quarter"/>
+          </p:nvPr>
+        </p:nvSpPr>
+        <p:spPr/>
+        <p:txBody>
+          <a:bodyPr/>
+          <a:lstStyle/>
+          <a:p/>
+        </p:txBody>
+      </p:sp>
+    </p:spTree>
+  </p:cSld>
+  <p:clrMapOvr>
+    <a:masterClrMapping/>
+  </p:clrMapOvr>
+</p:sld>
+</file>
+
+<file path=ppt/slides/slide10.xml><?xml version="1.0" encoding="utf-8"?>
+<p:sld xmlns:a="http://schemas.openxmlformats.org/drawingml/2006/main" xmlns:p="http://schemas.openxmlformats.org/presentationml/2006/main" xmlns:r="http://schemas.openxmlformats.org/officeDocument/2006/relationships">
+  <p:cSld>
+    <p:spTree>
+      <p:nvGrpSpPr>
+        <p:cNvPr id="1" name=""/>
+        <p:cNvGrpSpPr/>
+        <p:nvPr/>
+      </p:nvGrpSpPr>
+      <p:grpSpPr/>
+      <p:sp>
+        <p:nvSpPr>
+          <p:cNvPr id="2" name="Picture Placeholder 1"/>
           <p:cNvSpPr>
             <a:spLocks noGrp="1"/>
           </p:cNvSpPr>
@@ -3177,11 +3398,136 @@
       </p:sp>
       <p:sp>
         <p:nvSpPr>
+          <p:cNvPr id="3" name="Text Placeholder 2"/>
+          <p:cNvSpPr>
+            <a:spLocks noGrp="1"/>
+          </p:cNvSpPr>
+          <p:nvPr>
+            <p:ph type="body" idx="10" sz="quarter"/>
+          </p:nvPr>
+        </p:nvSpPr>
+        <p:spPr/>
+        <p:txBody>
+          <a:bodyPr/>
+          <a:lstStyle/>
+          <a:p>
+            <a:pPr algn="l"/>
+            <a:r>
+              <a:t>Pipeline Stages</a:t>
+            </a:r>
+          </a:p>
+        </p:txBody>
+      </p:sp>
+      <p:sp>
+        <p:nvSpPr>
+          <p:cNvPr id="4" name="Text Placeholder 3"/>
+          <p:cNvSpPr>
+            <a:spLocks noGrp="1"/>
+          </p:cNvSpPr>
+          <p:nvPr>
+            <p:ph type="body" idx="14" sz="quarter"/>
+          </p:nvPr>
+        </p:nvSpPr>
+        <p:spPr/>
+        <p:txBody>
+          <a:bodyPr/>
+          <a:lstStyle/>
+          <a:p>
+            <a:pPr/>
+            <a:r>
+              <a:t>Build and unit testing phase</a:t>
+            </a:r>
+          </a:p>
+          <a:p>
+            <a:pPr/>
+            <a:r>
+              <a:t>Security scanning integration</a:t>
+            </a:r>
+          </a:p>
+          <a:p>
+            <a:pPr/>
+            <a:r>
+              <a:t>Multi-environment deployment</a:t>
+            </a:r>
+          </a:p>
+        </p:txBody>
+      </p:sp>
+      <p:sp>
+        <p:nvSpPr>
           <p:cNvPr id="5" name="Text Placeholder 4"/>
           <p:cNvSpPr>
             <a:spLocks noGrp="1"/>
           </p:cNvSpPr>
           <p:nvPr>
+            <p:ph type="body" idx="15" sz="quarter"/>
+          </p:nvPr>
+        </p:nvSpPr>
+        <p:spPr/>
+        <p:txBody>
+          <a:bodyPr/>
+          <a:lstStyle/>
+          <a:p/>
+        </p:txBody>
+      </p:sp>
+    </p:spTree>
+  </p:cSld>
+  <p:clrMapOvr>
+    <a:masterClrMapping/>
+  </p:clrMapOvr>
+</p:sld>
+</file>
+
+<file path=ppt/slides/slide11.xml><?xml version="1.0" encoding="utf-8"?>
+<p:sld xmlns:a="http://schemas.openxmlformats.org/drawingml/2006/main" xmlns:p="http://schemas.openxmlformats.org/presentationml/2006/main" xmlns:r="http://schemas.openxmlformats.org/officeDocument/2006/relationships">
+  <p:cSld>
+    <p:spTree>
+      <p:nvGrpSpPr>
+        <p:cNvPr id="1" name=""/>
+        <p:cNvGrpSpPr/>
+        <p:nvPr/>
+      </p:nvGrpSpPr>
+      <p:grpSpPr/>
+      <p:sp>
+        <p:nvSpPr>
+          <p:cNvPr id="2" name="Picture Placeholder 1"/>
+          <p:cNvSpPr>
+            <a:spLocks noGrp="1"/>
+          </p:cNvSpPr>
+          <p:nvPr>
+            <p:ph type="pic" idx="13" sz="quarter"/>
+          </p:nvPr>
+        </p:nvSpPr>
+        <p:spPr/>
+      </p:sp>
+      <p:sp>
+        <p:nvSpPr>
+          <p:cNvPr id="3" name="Text Placeholder 2"/>
+          <p:cNvSpPr>
+            <a:spLocks noGrp="1"/>
+          </p:cNvSpPr>
+          <p:nvPr>
+            <p:ph type="body" idx="10" sz="quarter"/>
+          </p:nvPr>
+        </p:nvSpPr>
+        <p:spPr/>
+        <p:txBody>
+          <a:bodyPr/>
+          <a:lstStyle/>
+          <a:p>
+            <a:pPr algn="l"/>
+            <a:r>
+              <a:t>Deployment Strategy</a:t>
+            </a:r>
+          </a:p>
+        </p:txBody>
+      </p:sp>
+      <p:sp>
+        <p:nvSpPr>
+          <p:cNvPr id="4" name="Text Placeholder 3"/>
+          <p:cNvSpPr>
+            <a:spLocks noGrp="1"/>
+          </p:cNvSpPr>
+          <p:nvPr>
             <p:ph type="body" idx="14" sz="quarter"/>
           </p:nvPr>
         </p:nvSpPr>
@@ -3190,15 +3536,28 @@
           <a:bodyPr/>
           <a:lstStyle/>
           <a:p>
-            <a:r>
-              <a:t>Solution Name</a:t>
-            </a:r>
-          </a:p>
-        </p:txBody>
-      </p:sp>
-      <p:sp>
-        <p:nvSpPr>
-          <p:cNvPr id="6" name="Text Placeholder 5"/>
+            <a:pPr/>
+            <a:r>
+              <a:t>Blue-green zero-downtime deploy</a:t>
+            </a:r>
+          </a:p>
+          <a:p>
+            <a:pPr/>
+            <a:r>
+              <a:t>Canary release capability</a:t>
+            </a:r>
+          </a:p>
+          <a:p>
+            <a:pPr/>
+            <a:r>
+              <a:t>Automated rollback enabled</a:t>
+            </a:r>
+          </a:p>
+        </p:txBody>
+      </p:sp>
+      <p:sp>
+        <p:nvSpPr>
+          <p:cNvPr id="5" name="Text Placeholder 4"/>
           <p:cNvSpPr>
             <a:spLocks noGrp="1"/>
           </p:cNvSpPr>
@@ -3210,11 +3569,2170 @@
         <p:txBody>
           <a:bodyPr/>
           <a:lstStyle/>
-          <a:p>
-            <a:r>
-              <a:t>Presenter Name | November 15, 2025</a:t>
-            </a:r>
-          </a:p>
+          <a:p/>
+        </p:txBody>
+      </p:sp>
+    </p:spTree>
+  </p:cSld>
+  <p:clrMapOvr>
+    <a:masterClrMapping/>
+  </p:clrMapOvr>
+</p:sld>
+</file>
+
+<file path=ppt/slides/slide12.xml><?xml version="1.0" encoding="utf-8"?>
+<p:sld xmlns:a="http://schemas.openxmlformats.org/drawingml/2006/main" xmlns:p="http://schemas.openxmlformats.org/presentationml/2006/main" xmlns:r="http://schemas.openxmlformats.org/officeDocument/2006/relationships">
+  <p:cSld>
+    <p:spTree>
+      <p:nvGrpSpPr>
+        <p:cNvPr id="1" name=""/>
+        <p:cNvGrpSpPr/>
+        <p:nvPr/>
+      </p:nvGrpSpPr>
+      <p:grpSpPr/>
+      <p:sp>
+        <p:nvSpPr>
+          <p:cNvPr id="2" name="Picture Placeholder 1"/>
+          <p:cNvSpPr>
+            <a:spLocks noGrp="1"/>
+          </p:cNvSpPr>
+          <p:nvPr>
+            <p:ph type="pic" idx="13" sz="quarter"/>
+          </p:nvPr>
+        </p:nvSpPr>
+        <p:spPr/>
+      </p:sp>
+      <p:sp>
+        <p:nvSpPr>
+          <p:cNvPr id="3" name="Text Placeholder 2"/>
+          <p:cNvSpPr>
+            <a:spLocks noGrp="1"/>
+          </p:cNvSpPr>
+          <p:nvPr>
+            <p:ph type="body" idx="10" sz="quarter"/>
+          </p:nvPr>
+        </p:nvSpPr>
+        <p:spPr/>
+        <p:txBody>
+          <a:bodyPr/>
+          <a:lstStyle/>
+          <a:p>
+            <a:pPr algn="l"/>
+            <a:r>
+              <a:t>Environment Management</a:t>
+            </a:r>
+          </a:p>
+        </p:txBody>
+      </p:sp>
+      <p:sp>
+        <p:nvSpPr>
+          <p:cNvPr id="4" name="Text Placeholder 3"/>
+          <p:cNvSpPr>
+            <a:spLocks noGrp="1"/>
+          </p:cNvSpPr>
+          <p:nvPr>
+            <p:ph type="body" idx="14" sz="quarter"/>
+          </p:nvPr>
+        </p:nvSpPr>
+        <p:spPr/>
+        <p:txBody>
+          <a:bodyPr/>
+          <a:lstStyle/>
+          <a:p>
+            <a:pPr/>
+            <a:r>
+              <a:t>Development auto-deployment</a:t>
+            </a:r>
+          </a:p>
+          <a:p>
+            <a:pPr/>
+            <a:r>
+              <a:t>Staging with team approval</a:t>
+            </a:r>
+          </a:p>
+          <a:p>
+            <a:pPr/>
+            <a:r>
+              <a:t>Production with CAB approval</a:t>
+            </a:r>
+          </a:p>
+        </p:txBody>
+      </p:sp>
+      <p:sp>
+        <p:nvSpPr>
+          <p:cNvPr id="5" name="Text Placeholder 4"/>
+          <p:cNvSpPr>
+            <a:spLocks noGrp="1"/>
+          </p:cNvSpPr>
+          <p:nvPr>
+            <p:ph type="body" idx="15" sz="quarter"/>
+          </p:nvPr>
+        </p:nvSpPr>
+        <p:spPr/>
+        <p:txBody>
+          <a:bodyPr/>
+          <a:lstStyle/>
+          <a:p/>
+        </p:txBody>
+      </p:sp>
+    </p:spTree>
+  </p:cSld>
+  <p:clrMapOvr>
+    <a:masterClrMapping/>
+  </p:clrMapOvr>
+</p:sld>
+</file>
+
+<file path=ppt/slides/slide13.xml><?xml version="1.0" encoding="utf-8"?>
+<p:sld xmlns:a="http://schemas.openxmlformats.org/drawingml/2006/main" xmlns:p="http://schemas.openxmlformats.org/presentationml/2006/main" xmlns:r="http://schemas.openxmlformats.org/officeDocument/2006/relationships">
+  <p:cSld>
+    <p:spTree>
+      <p:nvGrpSpPr>
+        <p:cNvPr id="1" name=""/>
+        <p:cNvGrpSpPr/>
+        <p:nvPr/>
+      </p:nvGrpSpPr>
+      <p:grpSpPr/>
+      <p:sp>
+        <p:nvSpPr>
+          <p:cNvPr id="2" name="Picture Placeholder 1"/>
+          <p:cNvSpPr>
+            <a:spLocks noGrp="1"/>
+          </p:cNvSpPr>
+          <p:nvPr>
+            <p:ph type="pic" idx="13" sz="quarter"/>
+          </p:nvPr>
+        </p:nvSpPr>
+        <p:spPr/>
+      </p:sp>
+      <p:sp>
+        <p:nvSpPr>
+          <p:cNvPr id="3" name="Text Placeholder 2"/>
+          <p:cNvSpPr>
+            <a:spLocks noGrp="1"/>
+          </p:cNvSpPr>
+          <p:nvPr>
+            <p:ph type="body" idx="10" sz="quarter"/>
+          </p:nvPr>
+        </p:nvSpPr>
+        <p:spPr/>
+        <p:txBody>
+          <a:bodyPr/>
+          <a:lstStyle/>
+          <a:p>
+            <a:pPr algn="l"/>
+            <a:r>
+              <a:t>Functional Testing</a:t>
+            </a:r>
+          </a:p>
+        </p:txBody>
+      </p:sp>
+      <p:sp>
+        <p:nvSpPr>
+          <p:cNvPr id="4" name="Text Placeholder 3"/>
+          <p:cNvSpPr>
+            <a:spLocks noGrp="1"/>
+          </p:cNvSpPr>
+          <p:nvPr>
+            <p:ph type="body" idx="14" sz="quarter"/>
+          </p:nvPr>
+        </p:nvSpPr>
+        <p:spPr/>
+        <p:txBody>
+          <a:bodyPr/>
+          <a:lstStyle/>
+          <a:p>
+            <a:pPr/>
+            <a:r>
+              <a:t>15 test cases executed</a:t>
+            </a:r>
+          </a:p>
+          <a:p>
+            <a:pPr/>
+            <a:r>
+              <a:t>100% pass rate achieved</a:t>
+            </a:r>
+          </a:p>
+          <a:p>
+            <a:pPr/>
+            <a:r>
+              <a:t>All integrations validated</a:t>
+            </a:r>
+          </a:p>
+        </p:txBody>
+      </p:sp>
+      <p:sp>
+        <p:nvSpPr>
+          <p:cNvPr id="5" name="Text Placeholder 4"/>
+          <p:cNvSpPr>
+            <a:spLocks noGrp="1"/>
+          </p:cNvSpPr>
+          <p:nvPr>
+            <p:ph type="body" idx="15" sz="quarter"/>
+          </p:nvPr>
+        </p:nvSpPr>
+        <p:spPr/>
+        <p:txBody>
+          <a:bodyPr/>
+          <a:lstStyle/>
+          <a:p/>
+        </p:txBody>
+      </p:sp>
+    </p:spTree>
+  </p:cSld>
+  <p:clrMapOvr>
+    <a:masterClrMapping/>
+  </p:clrMapOvr>
+</p:sld>
+</file>
+
+<file path=ppt/slides/slide14.xml><?xml version="1.0" encoding="utf-8"?>
+<p:sld xmlns:a="http://schemas.openxmlformats.org/drawingml/2006/main" xmlns:p="http://schemas.openxmlformats.org/presentationml/2006/main" xmlns:r="http://schemas.openxmlformats.org/officeDocument/2006/relationships">
+  <p:cSld>
+    <p:spTree>
+      <p:nvGrpSpPr>
+        <p:cNvPr id="1" name=""/>
+        <p:cNvGrpSpPr/>
+        <p:nvPr/>
+      </p:nvGrpSpPr>
+      <p:grpSpPr/>
+      <p:sp>
+        <p:nvSpPr>
+          <p:cNvPr id="2" name="Picture Placeholder 1"/>
+          <p:cNvSpPr>
+            <a:spLocks noGrp="1"/>
+          </p:cNvSpPr>
+          <p:nvPr>
+            <p:ph type="pic" idx="13" sz="quarter"/>
+          </p:nvPr>
+        </p:nvSpPr>
+        <p:spPr/>
+      </p:sp>
+      <p:sp>
+        <p:nvSpPr>
+          <p:cNvPr id="3" name="Text Placeholder 2"/>
+          <p:cNvSpPr>
+            <a:spLocks noGrp="1"/>
+          </p:cNvSpPr>
+          <p:nvPr>
+            <p:ph type="body" idx="10" sz="quarter"/>
+          </p:nvPr>
+        </p:nvSpPr>
+        <p:spPr/>
+        <p:txBody>
+          <a:bodyPr/>
+          <a:lstStyle/>
+          <a:p>
+            <a:pPr algn="l"/>
+            <a:r>
+              <a:t>Performance Testing</a:t>
+            </a:r>
+          </a:p>
+        </p:txBody>
+      </p:sp>
+      <p:sp>
+        <p:nvSpPr>
+          <p:cNvPr id="4" name="Text Placeholder 3"/>
+          <p:cNvSpPr>
+            <a:spLocks noGrp="1"/>
+          </p:cNvSpPr>
+          <p:nvPr>
+            <p:ph type="body" idx="14" sz="quarter"/>
+          </p:nvPr>
+        </p:nvSpPr>
+        <p:spPr/>
+        <p:txBody>
+          <a:bodyPr/>
+          <a:lstStyle/>
+          <a:p>
+            <a:pPr/>
+            <a:r>
+              <a:t>Build time under 10 minutes</a:t>
+            </a:r>
+          </a:p>
+          <a:p>
+            <a:pPr/>
+            <a:r>
+              <a:t>Deploy time under 5 minutes</a:t>
+            </a:r>
+          </a:p>
+          <a:p>
+            <a:pPr/>
+            <a:r>
+              <a:t>Queue time under 2 minutes</a:t>
+            </a:r>
+          </a:p>
+        </p:txBody>
+      </p:sp>
+      <p:sp>
+        <p:nvSpPr>
+          <p:cNvPr id="5" name="Text Placeholder 4"/>
+          <p:cNvSpPr>
+            <a:spLocks noGrp="1"/>
+          </p:cNvSpPr>
+          <p:nvPr>
+            <p:ph type="body" idx="15" sz="quarter"/>
+          </p:nvPr>
+        </p:nvSpPr>
+        <p:spPr/>
+        <p:txBody>
+          <a:bodyPr/>
+          <a:lstStyle/>
+          <a:p/>
+        </p:txBody>
+      </p:sp>
+    </p:spTree>
+  </p:cSld>
+  <p:clrMapOvr>
+    <a:masterClrMapping/>
+  </p:clrMapOvr>
+</p:sld>
+</file>
+
+<file path=ppt/slides/slide15.xml><?xml version="1.0" encoding="utf-8"?>
+<p:sld xmlns:a="http://schemas.openxmlformats.org/drawingml/2006/main" xmlns:p="http://schemas.openxmlformats.org/presentationml/2006/main" xmlns:r="http://schemas.openxmlformats.org/officeDocument/2006/relationships">
+  <p:cSld>
+    <p:spTree>
+      <p:nvGrpSpPr>
+        <p:cNvPr id="1" name=""/>
+        <p:cNvGrpSpPr/>
+        <p:nvPr/>
+      </p:nvGrpSpPr>
+      <p:grpSpPr/>
+      <p:sp>
+        <p:nvSpPr>
+          <p:cNvPr id="2" name="Picture Placeholder 1"/>
+          <p:cNvSpPr>
+            <a:spLocks noGrp="1"/>
+          </p:cNvSpPr>
+          <p:nvPr>
+            <p:ph type="pic" idx="13" sz="quarter"/>
+          </p:nvPr>
+        </p:nvSpPr>
+        <p:spPr/>
+      </p:sp>
+      <p:sp>
+        <p:nvSpPr>
+          <p:cNvPr id="3" name="Text Placeholder 2"/>
+          <p:cNvSpPr>
+            <a:spLocks noGrp="1"/>
+          </p:cNvSpPr>
+          <p:nvPr>
+            <p:ph type="body" idx="10" sz="quarter"/>
+          </p:nvPr>
+        </p:nvSpPr>
+        <p:spPr/>
+        <p:txBody>
+          <a:bodyPr/>
+          <a:lstStyle/>
+          <a:p>
+            <a:pPr algn="l"/>
+            <a:r>
+              <a:t>Security Validation</a:t>
+            </a:r>
+          </a:p>
+        </p:txBody>
+      </p:sp>
+      <p:sp>
+        <p:nvSpPr>
+          <p:cNvPr id="4" name="Text Placeholder 3"/>
+          <p:cNvSpPr>
+            <a:spLocks noGrp="1"/>
+          </p:cNvSpPr>
+          <p:nvPr>
+            <p:ph type="body" idx="14" sz="quarter"/>
+          </p:nvPr>
+        </p:nvSpPr>
+        <p:spPr/>
+        <p:txBody>
+          <a:bodyPr/>
+          <a:lstStyle/>
+          <a:p>
+            <a:pPr/>
+            <a:r>
+              <a:t>SAST scanning operational</a:t>
+            </a:r>
+          </a:p>
+          <a:p>
+            <a:pPr/>
+            <a:r>
+              <a:t>SCA scanning operational</a:t>
+            </a:r>
+          </a:p>
+          <a:p>
+            <a:pPr/>
+            <a:r>
+              <a:t>Container scanning active</a:t>
+            </a:r>
+          </a:p>
+        </p:txBody>
+      </p:sp>
+      <p:sp>
+        <p:nvSpPr>
+          <p:cNvPr id="5" name="Text Placeholder 4"/>
+          <p:cNvSpPr>
+            <a:spLocks noGrp="1"/>
+          </p:cNvSpPr>
+          <p:nvPr>
+            <p:ph type="body" idx="15" sz="quarter"/>
+          </p:nvPr>
+        </p:nvSpPr>
+        <p:spPr/>
+        <p:txBody>
+          <a:bodyPr/>
+          <a:lstStyle/>
+          <a:p/>
+        </p:txBody>
+      </p:sp>
+    </p:spTree>
+  </p:cSld>
+  <p:clrMapOvr>
+    <a:masterClrMapping/>
+  </p:clrMapOvr>
+</p:sld>
+</file>
+
+<file path=ppt/slides/slide16.xml><?xml version="1.0" encoding="utf-8"?>
+<p:sld xmlns:a="http://schemas.openxmlformats.org/drawingml/2006/main" xmlns:p="http://schemas.openxmlformats.org/presentationml/2006/main" xmlns:r="http://schemas.openxmlformats.org/officeDocument/2006/relationships">
+  <p:cSld>
+    <p:spTree>
+      <p:nvGrpSpPr>
+        <p:cNvPr id="1" name=""/>
+        <p:cNvGrpSpPr/>
+        <p:nvPr/>
+      </p:nvGrpSpPr>
+      <p:grpSpPr/>
+      <p:sp>
+        <p:nvSpPr>
+          <p:cNvPr id="2" name="Picture Placeholder 1"/>
+          <p:cNvSpPr>
+            <a:spLocks noGrp="1"/>
+          </p:cNvSpPr>
+          <p:nvPr>
+            <p:ph type="pic" idx="13" sz="quarter"/>
+          </p:nvPr>
+        </p:nvSpPr>
+        <p:spPr/>
+      </p:sp>
+      <p:sp>
+        <p:nvSpPr>
+          <p:cNvPr id="3" name="Text Placeholder 2"/>
+          <p:cNvSpPr>
+            <a:spLocks noGrp="1"/>
+          </p:cNvSpPr>
+          <p:nvPr>
+            <p:ph type="body" idx="10" sz="quarter"/>
+          </p:nvPr>
+        </p:nvSpPr>
+        <p:spPr/>
+        <p:txBody>
+          <a:bodyPr/>
+          <a:lstStyle/>
+          <a:p>
+            <a:pPr algn="l"/>
+            <a:r>
+              <a:t>Developer Training</a:t>
+            </a:r>
+          </a:p>
+        </p:txBody>
+      </p:sp>
+      <p:sp>
+        <p:nvSpPr>
+          <p:cNvPr id="4" name="Text Placeholder 3"/>
+          <p:cNvSpPr>
+            <a:spLocks noGrp="1"/>
+          </p:cNvSpPr>
+          <p:nvPr>
+            <p:ph type="body" idx="14" sz="quarter"/>
+          </p:nvPr>
+        </p:nvSpPr>
+        <p:spPr/>
+        <p:txBody>
+          <a:bodyPr/>
+          <a:lstStyle/>
+          <a:p>
+            <a:pPr/>
+            <a:r>
+              <a:t>Pipeline authoring workshop</a:t>
+            </a:r>
+          </a:p>
+          <a:p>
+            <a:pPr/>
+            <a:r>
+              <a:t>Git workflow best practices</a:t>
+            </a:r>
+          </a:p>
+          <a:p>
+            <a:pPr/>
+            <a:r>
+              <a:t>25 developers certified</a:t>
+            </a:r>
+          </a:p>
+        </p:txBody>
+      </p:sp>
+      <p:sp>
+        <p:nvSpPr>
+          <p:cNvPr id="5" name="Text Placeholder 4"/>
+          <p:cNvSpPr>
+            <a:spLocks noGrp="1"/>
+          </p:cNvSpPr>
+          <p:nvPr>
+            <p:ph type="body" idx="15" sz="quarter"/>
+          </p:nvPr>
+        </p:nvSpPr>
+        <p:spPr/>
+        <p:txBody>
+          <a:bodyPr/>
+          <a:lstStyle/>
+          <a:p/>
+        </p:txBody>
+      </p:sp>
+    </p:spTree>
+  </p:cSld>
+  <p:clrMapOvr>
+    <a:masterClrMapping/>
+  </p:clrMapOvr>
+</p:sld>
+</file>
+
+<file path=ppt/slides/slide17.xml><?xml version="1.0" encoding="utf-8"?>
+<p:sld xmlns:a="http://schemas.openxmlformats.org/drawingml/2006/main" xmlns:p="http://schemas.openxmlformats.org/presentationml/2006/main" xmlns:r="http://schemas.openxmlformats.org/officeDocument/2006/relationships">
+  <p:cSld>
+    <p:spTree>
+      <p:nvGrpSpPr>
+        <p:cNvPr id="1" name=""/>
+        <p:cNvGrpSpPr/>
+        <p:nvPr/>
+      </p:nvGrpSpPr>
+      <p:grpSpPr/>
+      <p:sp>
+        <p:nvSpPr>
+          <p:cNvPr id="2" name="Picture Placeholder 1"/>
+          <p:cNvSpPr>
+            <a:spLocks noGrp="1"/>
+          </p:cNvSpPr>
+          <p:nvPr>
+            <p:ph type="pic" idx="13" sz="quarter"/>
+          </p:nvPr>
+        </p:nvSpPr>
+        <p:spPr/>
+      </p:sp>
+      <p:sp>
+        <p:nvSpPr>
+          <p:cNvPr id="3" name="Text Placeholder 2"/>
+          <p:cNvSpPr>
+            <a:spLocks noGrp="1"/>
+          </p:cNvSpPr>
+          <p:nvPr>
+            <p:ph type="body" idx="10" sz="quarter"/>
+          </p:nvPr>
+        </p:nvSpPr>
+        <p:spPr/>
+        <p:txBody>
+          <a:bodyPr/>
+          <a:lstStyle/>
+          <a:p>
+            <a:pPr algn="l"/>
+            <a:r>
+              <a:t>Operations Training</a:t>
+            </a:r>
+          </a:p>
+        </p:txBody>
+      </p:sp>
+      <p:sp>
+        <p:nvSpPr>
+          <p:cNvPr id="4" name="Text Placeholder 3"/>
+          <p:cNvSpPr>
+            <a:spLocks noGrp="1"/>
+          </p:cNvSpPr>
+          <p:nvPr>
+            <p:ph type="body" idx="14" sz="quarter"/>
+          </p:nvPr>
+        </p:nvSpPr>
+        <p:spPr/>
+        <p:txBody>
+          <a:bodyPr/>
+          <a:lstStyle/>
+          <a:p>
+            <a:pPr/>
+            <a:r>
+              <a:t>Platform administration guide</a:t>
+            </a:r>
+          </a:p>
+          <a:p>
+            <a:pPr/>
+            <a:r>
+              <a:t>Monitoring and alerting setup</a:t>
+            </a:r>
+          </a:p>
+          <a:p>
+            <a:pPr/>
+            <a:r>
+              <a:t>8 operators certified</a:t>
+            </a:r>
+          </a:p>
+        </p:txBody>
+      </p:sp>
+      <p:sp>
+        <p:nvSpPr>
+          <p:cNvPr id="5" name="Text Placeholder 4"/>
+          <p:cNvSpPr>
+            <a:spLocks noGrp="1"/>
+          </p:cNvSpPr>
+          <p:nvPr>
+            <p:ph type="body" idx="15" sz="quarter"/>
+          </p:nvPr>
+        </p:nvSpPr>
+        <p:spPr/>
+        <p:txBody>
+          <a:bodyPr/>
+          <a:lstStyle/>
+          <a:p/>
+        </p:txBody>
+      </p:sp>
+    </p:spTree>
+  </p:cSld>
+  <p:clrMapOvr>
+    <a:masterClrMapping/>
+  </p:clrMapOvr>
+</p:sld>
+</file>
+
+<file path=ppt/slides/slide18.xml><?xml version="1.0" encoding="utf-8"?>
+<p:sld xmlns:a="http://schemas.openxmlformats.org/drawingml/2006/main" xmlns:p="http://schemas.openxmlformats.org/presentationml/2006/main" xmlns:r="http://schemas.openxmlformats.org/officeDocument/2006/relationships">
+  <p:cSld>
+    <p:spTree>
+      <p:nvGrpSpPr>
+        <p:cNvPr id="1" name=""/>
+        <p:cNvGrpSpPr/>
+        <p:nvPr/>
+      </p:nvGrpSpPr>
+      <p:grpSpPr/>
+      <p:sp>
+        <p:nvSpPr>
+          <p:cNvPr id="2" name="Picture Placeholder 1"/>
+          <p:cNvSpPr>
+            <a:spLocks noGrp="1"/>
+          </p:cNvSpPr>
+          <p:nvPr>
+            <p:ph type="pic" idx="13" sz="quarter"/>
+          </p:nvPr>
+        </p:nvSpPr>
+        <p:spPr/>
+      </p:sp>
+      <p:sp>
+        <p:nvSpPr>
+          <p:cNvPr id="3" name="Text Placeholder 2"/>
+          <p:cNvSpPr>
+            <a:spLocks noGrp="1"/>
+          </p:cNvSpPr>
+          <p:nvPr>
+            <p:ph type="body" idx="10" sz="quarter"/>
+          </p:nvPr>
+        </p:nvSpPr>
+        <p:spPr/>
+        <p:txBody>
+          <a:bodyPr/>
+          <a:lstStyle/>
+          <a:p>
+            <a:pPr algn="l"/>
+            <a:r>
+              <a:t>Documentation Delivered</a:t>
+            </a:r>
+          </a:p>
+        </p:txBody>
+      </p:sp>
+      <p:sp>
+        <p:nvSpPr>
+          <p:cNvPr id="4" name="Text Placeholder 3"/>
+          <p:cNvSpPr>
+            <a:spLocks noGrp="1"/>
+          </p:cNvSpPr>
+          <p:nvPr>
+            <p:ph type="body" idx="14" sz="quarter"/>
+          </p:nvPr>
+        </p:nvSpPr>
+        <p:spPr/>
+        <p:txBody>
+          <a:bodyPr/>
+          <a:lstStyle/>
+          <a:p>
+            <a:pPr/>
+            <a:r>
+              <a:t>Administrator runbooks complete</a:t>
+            </a:r>
+          </a:p>
+          <a:p>
+            <a:pPr/>
+            <a:r>
+              <a:t>Developer quick-start guide</a:t>
+            </a:r>
+          </a:p>
+          <a:p>
+            <a:pPr/>
+            <a:r>
+              <a:t>Troubleshooting procedures</a:t>
+            </a:r>
+          </a:p>
+        </p:txBody>
+      </p:sp>
+      <p:sp>
+        <p:nvSpPr>
+          <p:cNvPr id="5" name="Text Placeholder 4"/>
+          <p:cNvSpPr>
+            <a:spLocks noGrp="1"/>
+          </p:cNvSpPr>
+          <p:nvPr>
+            <p:ph type="body" idx="15" sz="quarter"/>
+          </p:nvPr>
+        </p:nvSpPr>
+        <p:spPr/>
+        <p:txBody>
+          <a:bodyPr/>
+          <a:lstStyle/>
+          <a:p/>
+        </p:txBody>
+      </p:sp>
+    </p:spTree>
+  </p:cSld>
+  <p:clrMapOvr>
+    <a:masterClrMapping/>
+  </p:clrMapOvr>
+</p:sld>
+</file>
+
+<file path=ppt/slides/slide19.xml><?xml version="1.0" encoding="utf-8"?>
+<p:sld xmlns:a="http://schemas.openxmlformats.org/drawingml/2006/main" xmlns:p="http://schemas.openxmlformats.org/presentationml/2006/main" xmlns:r="http://schemas.openxmlformats.org/officeDocument/2006/relationships">
+  <p:cSld>
+    <p:spTree>
+      <p:nvGrpSpPr>
+        <p:cNvPr id="1" name=""/>
+        <p:cNvGrpSpPr/>
+        <p:nvPr/>
+      </p:nvGrpSpPr>
+      <p:grpSpPr/>
+      <p:sp>
+        <p:nvSpPr>
+          <p:cNvPr id="2" name="Picture Placeholder 1"/>
+          <p:cNvSpPr>
+            <a:spLocks noGrp="1"/>
+          </p:cNvSpPr>
+          <p:nvPr>
+            <p:ph type="pic" idx="13" sz="quarter"/>
+          </p:nvPr>
+        </p:nvSpPr>
+        <p:spPr/>
+      </p:sp>
+      <p:sp>
+        <p:nvSpPr>
+          <p:cNvPr id="3" name="Text Placeholder 2"/>
+          <p:cNvSpPr>
+            <a:spLocks noGrp="1"/>
+          </p:cNvSpPr>
+          <p:nvPr>
+            <p:ph type="body" idx="10" sz="quarter"/>
+          </p:nvPr>
+        </p:nvSpPr>
+        <p:spPr/>
+        <p:txBody>
+          <a:bodyPr/>
+          <a:lstStyle/>
+          <a:p>
+            <a:pPr algn="l"/>
+            <a:r>
+              <a:t>Monitoring Active</a:t>
+            </a:r>
+          </a:p>
+        </p:txBody>
+      </p:sp>
+      <p:sp>
+        <p:nvSpPr>
+          <p:cNvPr id="4" name="Text Placeholder 3"/>
+          <p:cNvSpPr>
+            <a:spLocks noGrp="1"/>
+          </p:cNvSpPr>
+          <p:nvPr>
+            <p:ph type="body" idx="14" sz="quarter"/>
+          </p:nvPr>
+        </p:nvSpPr>
+        <p:spPr/>
+        <p:txBody>
+          <a:bodyPr/>
+          <a:lstStyle/>
+          <a:p>
+            <a:pPr/>
+            <a:r>
+              <a:t>Platform health dashboards</a:t>
+            </a:r>
+          </a:p>
+          <a:p>
+            <a:pPr/>
+            <a:r>
+              <a:t>Pipeline execution monitoring</a:t>
+            </a:r>
+          </a:p>
+          <a:p>
+            <a:pPr/>
+            <a:r>
+              <a:t>Alert rules configured</a:t>
+            </a:r>
+          </a:p>
+        </p:txBody>
+      </p:sp>
+      <p:sp>
+        <p:nvSpPr>
+          <p:cNvPr id="5" name="Text Placeholder 4"/>
+          <p:cNvSpPr>
+            <a:spLocks noGrp="1"/>
+          </p:cNvSpPr>
+          <p:nvPr>
+            <p:ph type="body" idx="15" sz="quarter"/>
+          </p:nvPr>
+        </p:nvSpPr>
+        <p:spPr/>
+        <p:txBody>
+          <a:bodyPr/>
+          <a:lstStyle/>
+          <a:p/>
+        </p:txBody>
+      </p:sp>
+    </p:spTree>
+  </p:cSld>
+  <p:clrMapOvr>
+    <a:masterClrMapping/>
+  </p:clrMapOvr>
+</p:sld>
+</file>
+
+<file path=ppt/slides/slide2.xml><?xml version="1.0" encoding="utf-8"?>
+<p:sld xmlns:a="http://schemas.openxmlformats.org/drawingml/2006/main" xmlns:p="http://schemas.openxmlformats.org/presentationml/2006/main" xmlns:r="http://schemas.openxmlformats.org/officeDocument/2006/relationships">
+  <p:cSld>
+    <p:spTree>
+      <p:nvGrpSpPr>
+        <p:cNvPr id="1" name=""/>
+        <p:cNvGrpSpPr/>
+        <p:nvPr/>
+      </p:nvGrpSpPr>
+      <p:grpSpPr/>
+      <p:sp>
+        <p:nvSpPr>
+          <p:cNvPr id="2" name="Picture Placeholder 1"/>
+          <p:cNvSpPr>
+            <a:spLocks noGrp="1"/>
+          </p:cNvSpPr>
+          <p:nvPr>
+            <p:ph type="pic" idx="13" sz="quarter"/>
+          </p:nvPr>
+        </p:nvSpPr>
+        <p:spPr/>
+      </p:sp>
+      <p:sp>
+        <p:nvSpPr>
+          <p:cNvPr id="3" name="Text Placeholder 2"/>
+          <p:cNvSpPr>
+            <a:spLocks noGrp="1"/>
+          </p:cNvSpPr>
+          <p:nvPr>
+            <p:ph type="body" idx="10" sz="quarter"/>
+          </p:nvPr>
+        </p:nvSpPr>
+        <p:spPr/>
+        <p:txBody>
+          <a:bodyPr/>
+          <a:lstStyle/>
+          <a:p>
+            <a:pPr algn="l"/>
+            <a:r>
+              <a:t>Key Metrics Achieved</a:t>
+            </a:r>
+          </a:p>
+        </p:txBody>
+      </p:sp>
+      <p:sp>
+        <p:nvSpPr>
+          <p:cNvPr id="4" name="Text Placeholder 3"/>
+          <p:cNvSpPr>
+            <a:spLocks noGrp="1"/>
+          </p:cNvSpPr>
+          <p:nvPr>
+            <p:ph type="body" idx="14" sz="quarter"/>
+          </p:nvPr>
+        </p:nvSpPr>
+        <p:spPr/>
+        <p:txBody>
+          <a:bodyPr/>
+          <a:lstStyle/>
+          <a:p>
+            <a:pPr/>
+            <a:r>
+              <a:t>60% faster deployments realized</a:t>
+            </a:r>
+          </a:p>
+          <a:p>
+            <a:pPr/>
+            <a:r>
+              <a:t>10+ parallel build capacity</a:t>
+            </a:r>
+          </a:p>
+          <a:p>
+            <a:pPr/>
+            <a:r>
+              <a:t>99.9% platform availability</a:t>
+            </a:r>
+          </a:p>
+        </p:txBody>
+      </p:sp>
+      <p:sp>
+        <p:nvSpPr>
+          <p:cNvPr id="5" name="Text Placeholder 4"/>
+          <p:cNvSpPr>
+            <a:spLocks noGrp="1"/>
+          </p:cNvSpPr>
+          <p:nvPr>
+            <p:ph type="body" idx="15" sz="quarter"/>
+          </p:nvPr>
+        </p:nvSpPr>
+        <p:spPr/>
+        <p:txBody>
+          <a:bodyPr/>
+          <a:lstStyle/>
+          <a:p/>
+        </p:txBody>
+      </p:sp>
+    </p:spTree>
+  </p:cSld>
+  <p:clrMapOvr>
+    <a:masterClrMapping/>
+  </p:clrMapOvr>
+</p:sld>
+</file>
+
+<file path=ppt/slides/slide20.xml><?xml version="1.0" encoding="utf-8"?>
+<p:sld xmlns:a="http://schemas.openxmlformats.org/drawingml/2006/main" xmlns:p="http://schemas.openxmlformats.org/presentationml/2006/main" xmlns:r="http://schemas.openxmlformats.org/officeDocument/2006/relationships">
+  <p:cSld>
+    <p:spTree>
+      <p:nvGrpSpPr>
+        <p:cNvPr id="1" name=""/>
+        <p:cNvGrpSpPr/>
+        <p:nvPr/>
+      </p:nvGrpSpPr>
+      <p:grpSpPr/>
+      <p:sp>
+        <p:nvSpPr>
+          <p:cNvPr id="2" name="Picture Placeholder 1"/>
+          <p:cNvSpPr>
+            <a:spLocks noGrp="1"/>
+          </p:cNvSpPr>
+          <p:nvPr>
+            <p:ph type="pic" idx="13" sz="quarter"/>
+          </p:nvPr>
+        </p:nvSpPr>
+        <p:spPr/>
+      </p:sp>
+      <p:sp>
+        <p:nvSpPr>
+          <p:cNvPr id="3" name="Text Placeholder 2"/>
+          <p:cNvSpPr>
+            <a:spLocks noGrp="1"/>
+          </p:cNvSpPr>
+          <p:nvPr>
+            <p:ph type="body" idx="10" sz="quarter"/>
+          </p:nvPr>
+        </p:nvSpPr>
+        <p:spPr/>
+        <p:txBody>
+          <a:bodyPr/>
+          <a:lstStyle/>
+          <a:p>
+            <a:pPr algn="l"/>
+            <a:r>
+              <a:t>Support Model Ready</a:t>
+            </a:r>
+          </a:p>
+        </p:txBody>
+      </p:sp>
+      <p:sp>
+        <p:nvSpPr>
+          <p:cNvPr id="4" name="Text Placeholder 3"/>
+          <p:cNvSpPr>
+            <a:spLocks noGrp="1"/>
+          </p:cNvSpPr>
+          <p:nvPr>
+            <p:ph type="body" idx="14" sz="quarter"/>
+          </p:nvPr>
+        </p:nvSpPr>
+        <p:spPr/>
+        <p:txBody>
+          <a:bodyPr/>
+          <a:lstStyle/>
+          <a:p>
+            <a:pPr/>
+            <a:r>
+              <a:t>L1/L2/L3 procedures defined</a:t>
+            </a:r>
+          </a:p>
+          <a:p>
+            <a:pPr/>
+            <a:r>
+              <a:t>Escalation paths documented</a:t>
+            </a:r>
+          </a:p>
+          <a:p>
+            <a:pPr/>
+            <a:r>
+              <a:t>On-call rotation established</a:t>
+            </a:r>
+          </a:p>
+        </p:txBody>
+      </p:sp>
+      <p:sp>
+        <p:nvSpPr>
+          <p:cNvPr id="5" name="Text Placeholder 4"/>
+          <p:cNvSpPr>
+            <a:spLocks noGrp="1"/>
+          </p:cNvSpPr>
+          <p:nvPr>
+            <p:ph type="body" idx="15" sz="quarter"/>
+          </p:nvPr>
+        </p:nvSpPr>
+        <p:spPr/>
+        <p:txBody>
+          <a:bodyPr/>
+          <a:lstStyle/>
+          <a:p/>
+        </p:txBody>
+      </p:sp>
+    </p:spTree>
+  </p:cSld>
+  <p:clrMapOvr>
+    <a:masterClrMapping/>
+  </p:clrMapOvr>
+</p:sld>
+</file>
+
+<file path=ppt/slides/slide21.xml><?xml version="1.0" encoding="utf-8"?>
+<p:sld xmlns:a="http://schemas.openxmlformats.org/drawingml/2006/main" xmlns:p="http://schemas.openxmlformats.org/presentationml/2006/main" xmlns:r="http://schemas.openxmlformats.org/officeDocument/2006/relationships">
+  <p:cSld>
+    <p:spTree>
+      <p:nvGrpSpPr>
+        <p:cNvPr id="1" name=""/>
+        <p:cNvGrpSpPr/>
+        <p:nvPr/>
+      </p:nvGrpSpPr>
+      <p:grpSpPr/>
+      <p:sp>
+        <p:nvSpPr>
+          <p:cNvPr id="2" name="Picture Placeholder 1"/>
+          <p:cNvSpPr>
+            <a:spLocks noGrp="1"/>
+          </p:cNvSpPr>
+          <p:nvPr>
+            <p:ph type="pic" idx="13" sz="quarter"/>
+          </p:nvPr>
+        </p:nvSpPr>
+        <p:spPr/>
+      </p:sp>
+      <p:sp>
+        <p:nvSpPr>
+          <p:cNvPr id="3" name="Text Placeholder 2"/>
+          <p:cNvSpPr>
+            <a:spLocks noGrp="1"/>
+          </p:cNvSpPr>
+          <p:nvPr>
+            <p:ph type="body" idx="10" sz="quarter"/>
+          </p:nvPr>
+        </p:nvSpPr>
+        <p:spPr/>
+        <p:txBody>
+          <a:bodyPr/>
+          <a:lstStyle/>
+          <a:p>
+            <a:pPr algn="l"/>
+            <a:r>
+              <a:t>Hypercare Plan</a:t>
+            </a:r>
+          </a:p>
+        </p:txBody>
+      </p:sp>
+      <p:sp>
+        <p:nvSpPr>
+          <p:cNvPr id="4" name="Text Placeholder 3"/>
+          <p:cNvSpPr>
+            <a:spLocks noGrp="1"/>
+          </p:cNvSpPr>
+          <p:nvPr>
+            <p:ph type="body" idx="14" sz="quarter"/>
+          </p:nvPr>
+        </p:nvSpPr>
+        <p:spPr/>
+        <p:txBody>
+          <a:bodyPr/>
+          <a:lstStyle/>
+          <a:p>
+            <a:pPr/>
+            <a:r>
+              <a:t>30-day hypercare support</a:t>
+            </a:r>
+          </a:p>
+          <a:p>
+            <a:pPr/>
+            <a:r>
+              <a:t>Daily standup scheduled</a:t>
+            </a:r>
+          </a:p>
+          <a:p>
+            <a:pPr/>
+            <a:r>
+              <a:t>Issue tracking active</a:t>
+            </a:r>
+          </a:p>
+        </p:txBody>
+      </p:sp>
+      <p:sp>
+        <p:nvSpPr>
+          <p:cNvPr id="5" name="Text Placeholder 4"/>
+          <p:cNvSpPr>
+            <a:spLocks noGrp="1"/>
+          </p:cNvSpPr>
+          <p:nvPr>
+            <p:ph type="body" idx="15" sz="quarter"/>
+          </p:nvPr>
+        </p:nvSpPr>
+        <p:spPr/>
+        <p:txBody>
+          <a:bodyPr/>
+          <a:lstStyle/>
+          <a:p/>
+        </p:txBody>
+      </p:sp>
+    </p:spTree>
+  </p:cSld>
+  <p:clrMapOvr>
+    <a:masterClrMapping/>
+  </p:clrMapOvr>
+</p:sld>
+</file>
+
+<file path=ppt/slides/slide22.xml><?xml version="1.0" encoding="utf-8"?>
+<p:sld xmlns:a="http://schemas.openxmlformats.org/drawingml/2006/main" xmlns:p="http://schemas.openxmlformats.org/presentationml/2006/main" xmlns:r="http://schemas.openxmlformats.org/officeDocument/2006/relationships">
+  <p:cSld>
+    <p:spTree>
+      <p:nvGrpSpPr>
+        <p:cNvPr id="1" name=""/>
+        <p:cNvGrpSpPr/>
+        <p:nvPr/>
+      </p:nvGrpSpPr>
+      <p:grpSpPr/>
+      <p:sp>
+        <p:nvSpPr>
+          <p:cNvPr id="2" name="Picture Placeholder 1"/>
+          <p:cNvSpPr>
+            <a:spLocks noGrp="1"/>
+          </p:cNvSpPr>
+          <p:nvPr>
+            <p:ph type="pic" idx="13" sz="quarter"/>
+          </p:nvPr>
+        </p:nvSpPr>
+        <p:spPr/>
+      </p:sp>
+      <p:sp>
+        <p:nvSpPr>
+          <p:cNvPr id="3" name="Text Placeholder 2"/>
+          <p:cNvSpPr>
+            <a:spLocks noGrp="1"/>
+          </p:cNvSpPr>
+          <p:nvPr>
+            <p:ph type="body" idx="10" sz="quarter"/>
+          </p:nvPr>
+        </p:nvSpPr>
+        <p:spPr/>
+        <p:txBody>
+          <a:bodyPr/>
+          <a:lstStyle/>
+          <a:p>
+            <a:pPr algn="l"/>
+            <a:r>
+              <a:t>Week 1-2 Priorities</a:t>
+            </a:r>
+          </a:p>
+        </p:txBody>
+      </p:sp>
+      <p:sp>
+        <p:nvSpPr>
+          <p:cNvPr id="4" name="Text Placeholder 3"/>
+          <p:cNvSpPr>
+            <a:spLocks noGrp="1"/>
+          </p:cNvSpPr>
+          <p:nvPr>
+            <p:ph type="body" idx="14" sz="quarter"/>
+          </p:nvPr>
+        </p:nvSpPr>
+        <p:spPr/>
+        <p:txBody>
+          <a:bodyPr/>
+          <a:lstStyle/>
+          <a:p>
+            <a:pPr/>
+            <a:r>
+              <a:t>Complete team onboarding</a:t>
+            </a:r>
+          </a:p>
+          <a:p>
+            <a:pPr/>
+            <a:r>
+              <a:t>Monitor pipeline performance</a:t>
+            </a:r>
+          </a:p>
+          <a:p>
+            <a:pPr/>
+            <a:r>
+              <a:t>Address any issues promptly</a:t>
+            </a:r>
+          </a:p>
+        </p:txBody>
+      </p:sp>
+      <p:sp>
+        <p:nvSpPr>
+          <p:cNvPr id="5" name="Text Placeholder 4"/>
+          <p:cNvSpPr>
+            <a:spLocks noGrp="1"/>
+          </p:cNvSpPr>
+          <p:nvPr>
+            <p:ph type="body" idx="15" sz="quarter"/>
+          </p:nvPr>
+        </p:nvSpPr>
+        <p:spPr/>
+        <p:txBody>
+          <a:bodyPr/>
+          <a:lstStyle/>
+          <a:p/>
+        </p:txBody>
+      </p:sp>
+    </p:spTree>
+  </p:cSld>
+  <p:clrMapOvr>
+    <a:masterClrMapping/>
+  </p:clrMapOvr>
+</p:sld>
+</file>
+
+<file path=ppt/slides/slide23.xml><?xml version="1.0" encoding="utf-8"?>
+<p:sld xmlns:a="http://schemas.openxmlformats.org/drawingml/2006/main" xmlns:p="http://schemas.openxmlformats.org/presentationml/2006/main" xmlns:r="http://schemas.openxmlformats.org/officeDocument/2006/relationships">
+  <p:cSld>
+    <p:spTree>
+      <p:nvGrpSpPr>
+        <p:cNvPr id="1" name=""/>
+        <p:cNvGrpSpPr/>
+        <p:nvPr/>
+      </p:nvGrpSpPr>
+      <p:grpSpPr/>
+      <p:sp>
+        <p:nvSpPr>
+          <p:cNvPr id="2" name="Picture Placeholder 1"/>
+          <p:cNvSpPr>
+            <a:spLocks noGrp="1"/>
+          </p:cNvSpPr>
+          <p:nvPr>
+            <p:ph type="pic" idx="13" sz="quarter"/>
+          </p:nvPr>
+        </p:nvSpPr>
+        <p:spPr/>
+      </p:sp>
+      <p:sp>
+        <p:nvSpPr>
+          <p:cNvPr id="3" name="Text Placeholder 2"/>
+          <p:cNvSpPr>
+            <a:spLocks noGrp="1"/>
+          </p:cNvSpPr>
+          <p:nvPr>
+            <p:ph type="body" idx="10" sz="quarter"/>
+          </p:nvPr>
+        </p:nvSpPr>
+        <p:spPr/>
+        <p:txBody>
+          <a:bodyPr/>
+          <a:lstStyle/>
+          <a:p>
+            <a:pPr algn="l"/>
+            <a:r>
+              <a:t>30-Day Hypercare Focus</a:t>
+            </a:r>
+          </a:p>
+        </p:txBody>
+      </p:sp>
+      <p:sp>
+        <p:nvSpPr>
+          <p:cNvPr id="4" name="Text Placeholder 3"/>
+          <p:cNvSpPr>
+            <a:spLocks noGrp="1"/>
+          </p:cNvSpPr>
+          <p:nvPr>
+            <p:ph type="body" idx="14" sz="quarter"/>
+          </p:nvPr>
+        </p:nvSpPr>
+        <p:spPr/>
+        <p:txBody>
+          <a:bodyPr/>
+          <a:lstStyle/>
+          <a:p>
+            <a:pPr/>
+            <a:r>
+              <a:t>Optimize pipeline performance</a:t>
+            </a:r>
+          </a:p>
+          <a:p>
+            <a:pPr/>
+            <a:r>
+              <a:t>Tune security thresholds</a:t>
+            </a:r>
+          </a:p>
+          <a:p>
+            <a:pPr/>
+            <a:r>
+              <a:t>Refine alerting rules</a:t>
+            </a:r>
+          </a:p>
+        </p:txBody>
+      </p:sp>
+      <p:sp>
+        <p:nvSpPr>
+          <p:cNvPr id="5" name="Text Placeholder 4"/>
+          <p:cNvSpPr>
+            <a:spLocks noGrp="1"/>
+          </p:cNvSpPr>
+          <p:nvPr>
+            <p:ph type="body" idx="15" sz="quarter"/>
+          </p:nvPr>
+        </p:nvSpPr>
+        <p:spPr/>
+        <p:txBody>
+          <a:bodyPr/>
+          <a:lstStyle/>
+          <a:p/>
+        </p:txBody>
+      </p:sp>
+    </p:spTree>
+  </p:cSld>
+  <p:clrMapOvr>
+    <a:masterClrMapping/>
+  </p:clrMapOvr>
+</p:sld>
+</file>
+
+<file path=ppt/slides/slide24.xml><?xml version="1.0" encoding="utf-8"?>
+<p:sld xmlns:a="http://schemas.openxmlformats.org/drawingml/2006/main" xmlns:p="http://schemas.openxmlformats.org/presentationml/2006/main" xmlns:r="http://schemas.openxmlformats.org/officeDocument/2006/relationships">
+  <p:cSld>
+    <p:spTree>
+      <p:nvGrpSpPr>
+        <p:cNvPr id="1" name=""/>
+        <p:cNvGrpSpPr/>
+        <p:nvPr/>
+      </p:nvGrpSpPr>
+      <p:grpSpPr/>
+      <p:sp>
+        <p:nvSpPr>
+          <p:cNvPr id="2" name="Picture Placeholder 1"/>
+          <p:cNvSpPr>
+            <a:spLocks noGrp="1"/>
+          </p:cNvSpPr>
+          <p:nvPr>
+            <p:ph type="pic" idx="13" sz="quarter"/>
+          </p:nvPr>
+        </p:nvSpPr>
+        <p:spPr/>
+      </p:sp>
+      <p:sp>
+        <p:nvSpPr>
+          <p:cNvPr id="3" name="Text Placeholder 2"/>
+          <p:cNvSpPr>
+            <a:spLocks noGrp="1"/>
+          </p:cNvSpPr>
+          <p:nvPr>
+            <p:ph type="body" idx="10" sz="quarter"/>
+          </p:nvPr>
+        </p:nvSpPr>
+        <p:spPr/>
+        <p:txBody>
+          <a:bodyPr/>
+          <a:lstStyle/>
+          <a:p>
+            <a:pPr algn="l"/>
+            <a:r>
+              <a:t>Future Enhancements</a:t>
+            </a:r>
+          </a:p>
+        </p:txBody>
+      </p:sp>
+      <p:sp>
+        <p:nvSpPr>
+          <p:cNvPr id="4" name="Text Placeholder 3"/>
+          <p:cNvSpPr>
+            <a:spLocks noGrp="1"/>
+          </p:cNvSpPr>
+          <p:nvPr>
+            <p:ph type="body" idx="14" sz="quarter"/>
+          </p:nvPr>
+        </p:nvSpPr>
+        <p:spPr/>
+        <p:txBody>
+          <a:bodyPr/>
+          <a:lstStyle/>
+          <a:p>
+            <a:pPr/>
+            <a:r>
+              <a:t>Additional pipeline templates</a:t>
+            </a:r>
+          </a:p>
+          <a:p>
+            <a:pPr/>
+            <a:r>
+              <a:t>Advanced deployment patterns</a:t>
+            </a:r>
+          </a:p>
+          <a:p>
+            <a:pPr/>
+            <a:r>
+              <a:t>Extended monitoring coverage</a:t>
+            </a:r>
+          </a:p>
+        </p:txBody>
+      </p:sp>
+      <p:sp>
+        <p:nvSpPr>
+          <p:cNvPr id="5" name="Text Placeholder 4"/>
+          <p:cNvSpPr>
+            <a:spLocks noGrp="1"/>
+          </p:cNvSpPr>
+          <p:nvPr>
+            <p:ph type="body" idx="15" sz="quarter"/>
+          </p:nvPr>
+        </p:nvSpPr>
+        <p:spPr/>
+        <p:txBody>
+          <a:bodyPr/>
+          <a:lstStyle/>
+          <a:p/>
+        </p:txBody>
+      </p:sp>
+    </p:spTree>
+  </p:cSld>
+  <p:clrMapOvr>
+    <a:masterClrMapping/>
+  </p:clrMapOvr>
+</p:sld>
+</file>
+
+<file path=ppt/slides/slide3.xml><?xml version="1.0" encoding="utf-8"?>
+<p:sld xmlns:a="http://schemas.openxmlformats.org/drawingml/2006/main" xmlns:p="http://schemas.openxmlformats.org/presentationml/2006/main" xmlns:r="http://schemas.openxmlformats.org/officeDocument/2006/relationships">
+  <p:cSld>
+    <p:spTree>
+      <p:nvGrpSpPr>
+        <p:cNvPr id="1" name=""/>
+        <p:cNvGrpSpPr/>
+        <p:nvPr/>
+      </p:nvGrpSpPr>
+      <p:grpSpPr/>
+      <p:sp>
+        <p:nvSpPr>
+          <p:cNvPr id="2" name="Picture Placeholder 1"/>
+          <p:cNvSpPr>
+            <a:spLocks noGrp="1"/>
+          </p:cNvSpPr>
+          <p:nvPr>
+            <p:ph type="pic" idx="13" sz="quarter"/>
+          </p:nvPr>
+        </p:nvSpPr>
+        <p:spPr/>
+      </p:sp>
+      <p:sp>
+        <p:nvSpPr>
+          <p:cNvPr id="3" name="Text Placeholder 2"/>
+          <p:cNvSpPr>
+            <a:spLocks noGrp="1"/>
+          </p:cNvSpPr>
+          <p:nvPr>
+            <p:ph type="body" idx="10" sz="quarter"/>
+          </p:nvPr>
+        </p:nvSpPr>
+        <p:spPr/>
+        <p:txBody>
+          <a:bodyPr/>
+          <a:lstStyle/>
+          <a:p>
+            <a:pPr algn="l"/>
+            <a:r>
+              <a:t>Business Impact</a:t>
+            </a:r>
+          </a:p>
+        </p:txBody>
+      </p:sp>
+      <p:sp>
+        <p:nvSpPr>
+          <p:cNvPr id="4" name="Text Placeholder 3"/>
+          <p:cNvSpPr>
+            <a:spLocks noGrp="1"/>
+          </p:cNvSpPr>
+          <p:nvPr>
+            <p:ph type="body" idx="14" sz="quarter"/>
+          </p:nvPr>
+        </p:nvSpPr>
+        <p:spPr/>
+        <p:txBody>
+          <a:bodyPr/>
+          <a:lstStyle/>
+          <a:p>
+            <a:pPr/>
+            <a:r>
+              <a:t>Daily deployment frequency enabled</a:t>
+            </a:r>
+          </a:p>
+          <a:p>
+            <a:pPr/>
+            <a:r>
+              <a:t>Developer productivity improved 45%</a:t>
+            </a:r>
+          </a:p>
+          <a:p>
+            <a:pPr/>
+            <a:r>
+              <a:t>Zero-downtime deployment achieved</a:t>
+            </a:r>
+          </a:p>
+        </p:txBody>
+      </p:sp>
+      <p:sp>
+        <p:nvSpPr>
+          <p:cNvPr id="5" name="Text Placeholder 4"/>
+          <p:cNvSpPr>
+            <a:spLocks noGrp="1"/>
+          </p:cNvSpPr>
+          <p:nvPr>
+            <p:ph type="body" idx="15" sz="quarter"/>
+          </p:nvPr>
+        </p:nvSpPr>
+        <p:spPr/>
+        <p:txBody>
+          <a:bodyPr/>
+          <a:lstStyle/>
+          <a:p/>
+        </p:txBody>
+      </p:sp>
+    </p:spTree>
+  </p:cSld>
+  <p:clrMapOvr>
+    <a:masterClrMapping/>
+  </p:clrMapOvr>
+</p:sld>
+</file>
+
+<file path=ppt/slides/slide4.xml><?xml version="1.0" encoding="utf-8"?>
+<p:sld xmlns:a="http://schemas.openxmlformats.org/drawingml/2006/main" xmlns:p="http://schemas.openxmlformats.org/presentationml/2006/main" xmlns:r="http://schemas.openxmlformats.org/officeDocument/2006/relationships">
+  <p:cSld>
+    <p:spTree>
+      <p:nvGrpSpPr>
+        <p:cNvPr id="1" name=""/>
+        <p:cNvGrpSpPr/>
+        <p:nvPr/>
+      </p:nvGrpSpPr>
+      <p:grpSpPr/>
+      <p:sp>
+        <p:nvSpPr>
+          <p:cNvPr id="2" name="Picture Placeholder 1"/>
+          <p:cNvSpPr>
+            <a:spLocks noGrp="1"/>
+          </p:cNvSpPr>
+          <p:nvPr>
+            <p:ph type="pic" idx="13" sz="quarter"/>
+          </p:nvPr>
+        </p:nvSpPr>
+        <p:spPr/>
+      </p:sp>
+      <p:sp>
+        <p:nvSpPr>
+          <p:cNvPr id="3" name="Text Placeholder 2"/>
+          <p:cNvSpPr>
+            <a:spLocks noGrp="1"/>
+          </p:cNvSpPr>
+          <p:nvPr>
+            <p:ph type="body" idx="10" sz="quarter"/>
+          </p:nvPr>
+        </p:nvSpPr>
+        <p:spPr/>
+        <p:txBody>
+          <a:bodyPr/>
+          <a:lstStyle/>
+          <a:p>
+            <a:pPr algn="l"/>
+            <a:r>
+              <a:t>Deployment Acceleration</a:t>
+            </a:r>
+          </a:p>
+        </p:txBody>
+      </p:sp>
+      <p:sp>
+        <p:nvSpPr>
+          <p:cNvPr id="4" name="Text Placeholder 3"/>
+          <p:cNvSpPr>
+            <a:spLocks noGrp="1"/>
+          </p:cNvSpPr>
+          <p:nvPr>
+            <p:ph type="body" idx="14" sz="quarter"/>
+          </p:nvPr>
+        </p:nvSpPr>
+        <p:spPr/>
+        <p:txBody>
+          <a:bodyPr/>
+          <a:lstStyle/>
+          <a:p>
+            <a:pPr/>
+            <a:r>
+              <a:t>Deployment time: 4 hours to 90 min</a:t>
+            </a:r>
+          </a:p>
+          <a:p>
+            <a:pPr/>
+            <a:r>
+              <a:t>Release frequency: monthly to daily</a:t>
+            </a:r>
+          </a:p>
+          <a:p>
+            <a:pPr/>
+            <a:r>
+              <a:t>Success rate: 99.5% achieved</a:t>
+            </a:r>
+          </a:p>
+        </p:txBody>
+      </p:sp>
+      <p:sp>
+        <p:nvSpPr>
+          <p:cNvPr id="5" name="Text Placeholder 4"/>
+          <p:cNvSpPr>
+            <a:spLocks noGrp="1"/>
+          </p:cNvSpPr>
+          <p:nvPr>
+            <p:ph type="body" idx="15" sz="quarter"/>
+          </p:nvPr>
+        </p:nvSpPr>
+        <p:spPr/>
+        <p:txBody>
+          <a:bodyPr/>
+          <a:lstStyle/>
+          <a:p/>
+        </p:txBody>
+      </p:sp>
+    </p:spTree>
+  </p:cSld>
+  <p:clrMapOvr>
+    <a:masterClrMapping/>
+  </p:clrMapOvr>
+</p:sld>
+</file>
+
+<file path=ppt/slides/slide5.xml><?xml version="1.0" encoding="utf-8"?>
+<p:sld xmlns:a="http://schemas.openxmlformats.org/drawingml/2006/main" xmlns:p="http://schemas.openxmlformats.org/presentationml/2006/main" xmlns:r="http://schemas.openxmlformats.org/officeDocument/2006/relationships">
+  <p:cSld>
+    <p:spTree>
+      <p:nvGrpSpPr>
+        <p:cNvPr id="1" name=""/>
+        <p:cNvGrpSpPr/>
+        <p:nvPr/>
+      </p:nvGrpSpPr>
+      <p:grpSpPr/>
+      <p:sp>
+        <p:nvSpPr>
+          <p:cNvPr id="2" name="Picture Placeholder 1"/>
+          <p:cNvSpPr>
+            <a:spLocks noGrp="1"/>
+          </p:cNvSpPr>
+          <p:nvPr>
+            <p:ph type="pic" idx="13" sz="quarter"/>
+          </p:nvPr>
+        </p:nvSpPr>
+        <p:spPr/>
+      </p:sp>
+      <p:sp>
+        <p:nvSpPr>
+          <p:cNvPr id="3" name="Text Placeholder 2"/>
+          <p:cNvSpPr>
+            <a:spLocks noGrp="1"/>
+          </p:cNvSpPr>
+          <p:nvPr>
+            <p:ph type="body" idx="10" sz="quarter"/>
+          </p:nvPr>
+        </p:nvSpPr>
+        <p:spPr/>
+        <p:txBody>
+          <a:bodyPr/>
+          <a:lstStyle/>
+          <a:p>
+            <a:pPr algn="l"/>
+            <a:r>
+              <a:t>Developer Productivity</a:t>
+            </a:r>
+          </a:p>
+        </p:txBody>
+      </p:sp>
+      <p:sp>
+        <p:nvSpPr>
+          <p:cNvPr id="4" name="Text Placeholder 3"/>
+          <p:cNvSpPr>
+            <a:spLocks noGrp="1"/>
+          </p:cNvSpPr>
+          <p:nvPr>
+            <p:ph type="body" idx="14" sz="quarter"/>
+          </p:nvPr>
+        </p:nvSpPr>
+        <p:spPr/>
+        <p:txBody>
+          <a:bodyPr/>
+          <a:lstStyle/>
+          <a:p>
+            <a:pPr/>
+            <a:r>
+              <a:t>Build time reduced 65%</a:t>
+            </a:r>
+          </a:p>
+          <a:p>
+            <a:pPr/>
+            <a:r>
+              <a:t>Automation coverage: 90%</a:t>
+            </a:r>
+          </a:p>
+          <a:p>
+            <a:pPr/>
+            <a:r>
+              <a:t>Self-service enabled for teams</a:t>
+            </a:r>
+          </a:p>
+        </p:txBody>
+      </p:sp>
+      <p:sp>
+        <p:nvSpPr>
+          <p:cNvPr id="5" name="Text Placeholder 4"/>
+          <p:cNvSpPr>
+            <a:spLocks noGrp="1"/>
+          </p:cNvSpPr>
+          <p:nvPr>
+            <p:ph type="body" idx="15" sz="quarter"/>
+          </p:nvPr>
+        </p:nvSpPr>
+        <p:spPr/>
+        <p:txBody>
+          <a:bodyPr/>
+          <a:lstStyle/>
+          <a:p/>
+        </p:txBody>
+      </p:sp>
+    </p:spTree>
+  </p:cSld>
+  <p:clrMapOvr>
+    <a:masterClrMapping/>
+  </p:clrMapOvr>
+</p:sld>
+</file>
+
+<file path=ppt/slides/slide6.xml><?xml version="1.0" encoding="utf-8"?>
+<p:sld xmlns:a="http://schemas.openxmlformats.org/drawingml/2006/main" xmlns:p="http://schemas.openxmlformats.org/presentationml/2006/main" xmlns:r="http://schemas.openxmlformats.org/officeDocument/2006/relationships">
+  <p:cSld>
+    <p:spTree>
+      <p:nvGrpSpPr>
+        <p:cNvPr id="1" name=""/>
+        <p:cNvGrpSpPr/>
+        <p:nvPr/>
+      </p:nvGrpSpPr>
+      <p:grpSpPr/>
+      <p:sp>
+        <p:nvSpPr>
+          <p:cNvPr id="2" name="Picture Placeholder 1"/>
+          <p:cNvSpPr>
+            <a:spLocks noGrp="1"/>
+          </p:cNvSpPr>
+          <p:nvPr>
+            <p:ph type="pic" idx="13" sz="quarter"/>
+          </p:nvPr>
+        </p:nvSpPr>
+        <p:spPr/>
+      </p:sp>
+      <p:sp>
+        <p:nvSpPr>
+          <p:cNvPr id="3" name="Text Placeholder 2"/>
+          <p:cNvSpPr>
+            <a:spLocks noGrp="1"/>
+          </p:cNvSpPr>
+          <p:nvPr>
+            <p:ph type="body" idx="10" sz="quarter"/>
+          </p:nvPr>
+        </p:nvSpPr>
+        <p:spPr/>
+        <p:txBody>
+          <a:bodyPr/>
+          <a:lstStyle/>
+          <a:p>
+            <a:pPr algn="l"/>
+            <a:r>
+              <a:t>Cost Optimization</a:t>
+            </a:r>
+          </a:p>
+        </p:txBody>
+      </p:sp>
+      <p:sp>
+        <p:nvSpPr>
+          <p:cNvPr id="4" name="Text Placeholder 3"/>
+          <p:cNvSpPr>
+            <a:spLocks noGrp="1"/>
+          </p:cNvSpPr>
+          <p:nvPr>
+            <p:ph type="body" idx="14" sz="quarter"/>
+          </p:nvPr>
+        </p:nvSpPr>
+        <p:spPr/>
+        <p:txBody>
+          <a:bodyPr/>
+          <a:lstStyle/>
+          <a:p>
+            <a:pPr/>
+            <a:r>
+              <a:t>Infrastructure costs reduced 40%</a:t>
+            </a:r>
+          </a:p>
+          <a:p>
+            <a:pPr/>
+            <a:r>
+              <a:t>Tool consolidation completed</a:t>
+            </a:r>
+          </a:p>
+          <a:p>
+            <a:pPr/>
+            <a:r>
+              <a:t>Resource utilization optimized</a:t>
+            </a:r>
+          </a:p>
+        </p:txBody>
+      </p:sp>
+      <p:sp>
+        <p:nvSpPr>
+          <p:cNvPr id="5" name="Text Placeholder 4"/>
+          <p:cNvSpPr>
+            <a:spLocks noGrp="1"/>
+          </p:cNvSpPr>
+          <p:nvPr>
+            <p:ph type="body" idx="15" sz="quarter"/>
+          </p:nvPr>
+        </p:nvSpPr>
+        <p:spPr/>
+        <p:txBody>
+          <a:bodyPr/>
+          <a:lstStyle/>
+          <a:p/>
+        </p:txBody>
+      </p:sp>
+    </p:spTree>
+  </p:cSld>
+  <p:clrMapOvr>
+    <a:masterClrMapping/>
+  </p:clrMapOvr>
+</p:sld>
+</file>
+
+<file path=ppt/slides/slide7.xml><?xml version="1.0" encoding="utf-8"?>
+<p:sld xmlns:a="http://schemas.openxmlformats.org/drawingml/2006/main" xmlns:p="http://schemas.openxmlformats.org/presentationml/2006/main" xmlns:r="http://schemas.openxmlformats.org/officeDocument/2006/relationships">
+  <p:cSld>
+    <p:spTree>
+      <p:nvGrpSpPr>
+        <p:cNvPr id="1" name=""/>
+        <p:cNvGrpSpPr/>
+        <p:nvPr/>
+      </p:nvGrpSpPr>
+      <p:grpSpPr/>
+      <p:sp>
+        <p:nvSpPr>
+          <p:cNvPr id="2" name="Picture Placeholder 1"/>
+          <p:cNvSpPr>
+            <a:spLocks noGrp="1"/>
+          </p:cNvSpPr>
+          <p:nvPr>
+            <p:ph type="pic" idx="13" sz="quarter"/>
+          </p:nvPr>
+        </p:nvSpPr>
+        <p:spPr/>
+      </p:sp>
+      <p:sp>
+        <p:nvSpPr>
+          <p:cNvPr id="3" name="Text Placeholder 2"/>
+          <p:cNvSpPr>
+            <a:spLocks noGrp="1"/>
+          </p:cNvSpPr>
+          <p:nvPr>
+            <p:ph type="body" idx="10" sz="quarter"/>
+          </p:nvPr>
+        </p:nvSpPr>
+        <p:spPr/>
+        <p:txBody>
+          <a:bodyPr/>
+          <a:lstStyle/>
+          <a:p>
+            <a:pPr algn="l"/>
+            <a:r>
+              <a:t>Core Platform Components</a:t>
+            </a:r>
+          </a:p>
+        </p:txBody>
+      </p:sp>
+      <p:sp>
+        <p:nvSpPr>
+          <p:cNvPr id="4" name="Text Placeholder 3"/>
+          <p:cNvSpPr>
+            <a:spLocks noGrp="1"/>
+          </p:cNvSpPr>
+          <p:nvPr>
+            <p:ph type="body" idx="14" sz="quarter"/>
+          </p:nvPr>
+        </p:nvSpPr>
+        <p:spPr/>
+        <p:txBody>
+          <a:bodyPr/>
+          <a:lstStyle/>
+          <a:p>
+            <a:pPr/>
+            <a:r>
+              <a:t>Azure DevOps organization config</a:t>
+            </a:r>
+          </a:p>
+          <a:p>
+            <a:pPr/>
+            <a:r>
+              <a:t>Azure Container Registry (Premium)</a:t>
+            </a:r>
+          </a:p>
+          <a:p>
+            <a:pPr/>
+            <a:r>
+              <a:t>Azure Kubernetes Service cluster</a:t>
+            </a:r>
+          </a:p>
+        </p:txBody>
+      </p:sp>
+      <p:sp>
+        <p:nvSpPr>
+          <p:cNvPr id="5" name="Text Placeholder 4"/>
+          <p:cNvSpPr>
+            <a:spLocks noGrp="1"/>
+          </p:cNvSpPr>
+          <p:nvPr>
+            <p:ph type="body" idx="15" sz="quarter"/>
+          </p:nvPr>
+        </p:nvSpPr>
+        <p:spPr/>
+        <p:txBody>
+          <a:bodyPr/>
+          <a:lstStyle/>
+          <a:p/>
+        </p:txBody>
+      </p:sp>
+    </p:spTree>
+  </p:cSld>
+  <p:clrMapOvr>
+    <a:masterClrMapping/>
+  </p:clrMapOvr>
+</p:sld>
+</file>
+
+<file path=ppt/slides/slide8.xml><?xml version="1.0" encoding="utf-8"?>
+<p:sld xmlns:a="http://schemas.openxmlformats.org/drawingml/2006/main" xmlns:p="http://schemas.openxmlformats.org/presentationml/2006/main" xmlns:r="http://schemas.openxmlformats.org/officeDocument/2006/relationships">
+  <p:cSld>
+    <p:spTree>
+      <p:nvGrpSpPr>
+        <p:cNvPr id="1" name=""/>
+        <p:cNvGrpSpPr/>
+        <p:nvPr/>
+      </p:nvGrpSpPr>
+      <p:grpSpPr/>
+      <p:sp>
+        <p:nvSpPr>
+          <p:cNvPr id="2" name="Picture Placeholder 1"/>
+          <p:cNvSpPr>
+            <a:spLocks noGrp="1"/>
+          </p:cNvSpPr>
+          <p:nvPr>
+            <p:ph type="pic" idx="13" sz="quarter"/>
+          </p:nvPr>
+        </p:nvSpPr>
+        <p:spPr/>
+      </p:sp>
+      <p:sp>
+        <p:nvSpPr>
+          <p:cNvPr id="3" name="Text Placeholder 2"/>
+          <p:cNvSpPr>
+            <a:spLocks noGrp="1"/>
+          </p:cNvSpPr>
+          <p:nvPr>
+            <p:ph type="body" idx="10" sz="quarter"/>
+          </p:nvPr>
+        </p:nvSpPr>
+        <p:spPr/>
+        <p:txBody>
+          <a:bodyPr/>
+          <a:lstStyle/>
+          <a:p>
+            <a:pPr algn="l"/>
+            <a:r>
+              <a:t>CI/CD Automation</a:t>
+            </a:r>
+          </a:p>
+        </p:txBody>
+      </p:sp>
+      <p:sp>
+        <p:nvSpPr>
+          <p:cNvPr id="4" name="Text Placeholder 3"/>
+          <p:cNvSpPr>
+            <a:spLocks noGrp="1"/>
+          </p:cNvSpPr>
+          <p:nvPr>
+            <p:ph type="body" idx="14" sz="quarter"/>
+          </p:nvPr>
+        </p:nvSpPr>
+        <p:spPr/>
+        <p:txBody>
+          <a:bodyPr/>
+          <a:lstStyle/>
+          <a:p>
+            <a:pPr/>
+            <a:r>
+              <a:t>YAML pipeline templates library</a:t>
+            </a:r>
+          </a:p>
+          <a:p>
+            <a:pPr/>
+            <a:r>
+              <a:t>Multi-stage deployment pipelines</a:t>
+            </a:r>
+          </a:p>
+          <a:p>
+            <a:pPr/>
+            <a:r>
+              <a:t>Automated testing integration</a:t>
+            </a:r>
+          </a:p>
+        </p:txBody>
+      </p:sp>
+      <p:sp>
+        <p:nvSpPr>
+          <p:cNvPr id="5" name="Text Placeholder 4"/>
+          <p:cNvSpPr>
+            <a:spLocks noGrp="1"/>
+          </p:cNvSpPr>
+          <p:nvPr>
+            <p:ph type="body" idx="15" sz="quarter"/>
+          </p:nvPr>
+        </p:nvSpPr>
+        <p:spPr/>
+        <p:txBody>
+          <a:bodyPr/>
+          <a:lstStyle/>
+          <a:p/>
+        </p:txBody>
+      </p:sp>
+    </p:spTree>
+  </p:cSld>
+  <p:clrMapOvr>
+    <a:masterClrMapping/>
+  </p:clrMapOvr>
+</p:sld>
+</file>
+
+<file path=ppt/slides/slide9.xml><?xml version="1.0" encoding="utf-8"?>
+<p:sld xmlns:a="http://schemas.openxmlformats.org/drawingml/2006/main" xmlns:p="http://schemas.openxmlformats.org/presentationml/2006/main" xmlns:r="http://schemas.openxmlformats.org/officeDocument/2006/relationships">
+  <p:cSld>
+    <p:spTree>
+      <p:nvGrpSpPr>
+        <p:cNvPr id="1" name=""/>
+        <p:cNvGrpSpPr/>
+        <p:nvPr/>
+      </p:nvGrpSpPr>
+      <p:grpSpPr/>
+      <p:sp>
+        <p:nvSpPr>
+          <p:cNvPr id="2" name="Picture Placeholder 1"/>
+          <p:cNvSpPr>
+            <a:spLocks noGrp="1"/>
+          </p:cNvSpPr>
+          <p:nvPr>
+            <p:ph type="pic" idx="13" sz="quarter"/>
+          </p:nvPr>
+        </p:nvSpPr>
+        <p:spPr/>
+      </p:sp>
+      <p:sp>
+        <p:nvSpPr>
+          <p:cNvPr id="3" name="Text Placeholder 2"/>
+          <p:cNvSpPr>
+            <a:spLocks noGrp="1"/>
+          </p:cNvSpPr>
+          <p:nvPr>
+            <p:ph type="body" idx="10" sz="quarter"/>
+          </p:nvPr>
+        </p:nvSpPr>
+        <p:spPr/>
+        <p:txBody>
+          <a:bodyPr/>
+          <a:lstStyle/>
+          <a:p>
+            <a:pPr algn="l"/>
+            <a:r>
+              <a:t>Security Integration</a:t>
+            </a:r>
+          </a:p>
+        </p:txBody>
+      </p:sp>
+      <p:sp>
+        <p:nvSpPr>
+          <p:cNvPr id="4" name="Text Placeholder 3"/>
+          <p:cNvSpPr>
+            <a:spLocks noGrp="1"/>
+          </p:cNvSpPr>
+          <p:nvPr>
+            <p:ph type="body" idx="14" sz="quarter"/>
+          </p:nvPr>
+        </p:nvSpPr>
+        <p:spPr/>
+        <p:txBody>
+          <a:bodyPr/>
+          <a:lstStyle/>
+          <a:p>
+            <a:pPr/>
+            <a:r>
+              <a:t>SonarCloud code analysis</a:t>
+            </a:r>
+          </a:p>
+          <a:p>
+            <a:pPr/>
+            <a:r>
+              <a:t>WhiteSource dependency scanning</a:t>
+            </a:r>
+          </a:p>
+          <a:p>
+            <a:pPr/>
+            <a:r>
+              <a:t>Container vulnerability scanning</a:t>
+            </a:r>
+          </a:p>
+        </p:txBody>
+      </p:sp>
+      <p:sp>
+        <p:nvSpPr>
+          <p:cNvPr id="5" name="Text Placeholder 4"/>
+          <p:cNvSpPr>
+            <a:spLocks noGrp="1"/>
+          </p:cNvSpPr>
+          <p:nvPr>
+            <p:ph type="body" idx="15" sz="quarter"/>
+          </p:nvPr>
+        </p:nvSpPr>
+        <p:spPr/>
+        <p:txBody>
+          <a:bodyPr/>
+          <a:lstStyle/>
+          <a:p/>
         </p:txBody>
       </p:sp>
     </p:spTree>

</xml_diff>